<commit_message>
added a few details to storyboard + prob statement
</commit_message>
<xml_diff>
--- a/Documentation/Settlers StoryBoard.pptx
+++ b/Documentation/Settlers StoryBoard.pptx
@@ -23,6 +23,7 @@
     <p:sldId id="275" r:id="rId17"/>
     <p:sldId id="276" r:id="rId18"/>
     <p:sldId id="277" r:id="rId19"/>
+    <p:sldId id="281" r:id="rId20"/>
   </p:sldIdLst>
   <p:sldSz cx="12192000" cy="6858000"/>
   <p:notesSz cx="6858000" cy="9144000"/>
@@ -260,7 +261,7 @@
           <a:p>
             <a:fld id="{35180F86-B060-4501-977F-882C5FDEC063}" type="datetimeFigureOut">
               <a:rPr lang="en-US" smtClean="0"/>
-              <a:t>3/26/2015</a:t>
+              <a:t>3/27/2015</a:t>
             </a:fld>
             <a:endParaRPr lang="en-US"/>
           </a:p>
@@ -430,7 +431,7 @@
           <a:p>
             <a:fld id="{35180F86-B060-4501-977F-882C5FDEC063}" type="datetimeFigureOut">
               <a:rPr lang="en-US" smtClean="0"/>
-              <a:t>3/26/2015</a:t>
+              <a:t>3/27/2015</a:t>
             </a:fld>
             <a:endParaRPr lang="en-US"/>
           </a:p>
@@ -610,7 +611,7 @@
           <a:p>
             <a:fld id="{35180F86-B060-4501-977F-882C5FDEC063}" type="datetimeFigureOut">
               <a:rPr lang="en-US" smtClean="0"/>
-              <a:t>3/26/2015</a:t>
+              <a:t>3/27/2015</a:t>
             </a:fld>
             <a:endParaRPr lang="en-US"/>
           </a:p>
@@ -780,7 +781,7 @@
           <a:p>
             <a:fld id="{35180F86-B060-4501-977F-882C5FDEC063}" type="datetimeFigureOut">
               <a:rPr lang="en-US" smtClean="0"/>
-              <a:t>3/26/2015</a:t>
+              <a:t>3/27/2015</a:t>
             </a:fld>
             <a:endParaRPr lang="en-US"/>
           </a:p>
@@ -1026,7 +1027,7 @@
           <a:p>
             <a:fld id="{35180F86-B060-4501-977F-882C5FDEC063}" type="datetimeFigureOut">
               <a:rPr lang="en-US" smtClean="0"/>
-              <a:t>3/26/2015</a:t>
+              <a:t>3/27/2015</a:t>
             </a:fld>
             <a:endParaRPr lang="en-US"/>
           </a:p>
@@ -1258,7 +1259,7 @@
           <a:p>
             <a:fld id="{35180F86-B060-4501-977F-882C5FDEC063}" type="datetimeFigureOut">
               <a:rPr lang="en-US" smtClean="0"/>
-              <a:t>3/26/2015</a:t>
+              <a:t>3/27/2015</a:t>
             </a:fld>
             <a:endParaRPr lang="en-US"/>
           </a:p>
@@ -1625,7 +1626,7 @@
           <a:p>
             <a:fld id="{35180F86-B060-4501-977F-882C5FDEC063}" type="datetimeFigureOut">
               <a:rPr lang="en-US" smtClean="0"/>
-              <a:t>3/26/2015</a:t>
+              <a:t>3/27/2015</a:t>
             </a:fld>
             <a:endParaRPr lang="en-US"/>
           </a:p>
@@ -1743,7 +1744,7 @@
           <a:p>
             <a:fld id="{35180F86-B060-4501-977F-882C5FDEC063}" type="datetimeFigureOut">
               <a:rPr lang="en-US" smtClean="0"/>
-              <a:t>3/26/2015</a:t>
+              <a:t>3/27/2015</a:t>
             </a:fld>
             <a:endParaRPr lang="en-US"/>
           </a:p>
@@ -1838,7 +1839,7 @@
           <a:p>
             <a:fld id="{35180F86-B060-4501-977F-882C5FDEC063}" type="datetimeFigureOut">
               <a:rPr lang="en-US" smtClean="0"/>
-              <a:t>3/26/2015</a:t>
+              <a:t>3/27/2015</a:t>
             </a:fld>
             <a:endParaRPr lang="en-US"/>
           </a:p>
@@ -2115,7 +2116,7 @@
           <a:p>
             <a:fld id="{35180F86-B060-4501-977F-882C5FDEC063}" type="datetimeFigureOut">
               <a:rPr lang="en-US" smtClean="0"/>
-              <a:t>3/26/2015</a:t>
+              <a:t>3/27/2015</a:t>
             </a:fld>
             <a:endParaRPr lang="en-US"/>
           </a:p>
@@ -2368,7 +2369,7 @@
           <a:p>
             <a:fld id="{35180F86-B060-4501-977F-882C5FDEC063}" type="datetimeFigureOut">
               <a:rPr lang="en-US" smtClean="0"/>
-              <a:t>3/26/2015</a:t>
+              <a:t>3/27/2015</a:t>
             </a:fld>
             <a:endParaRPr lang="en-US"/>
           </a:p>
@@ -2581,7 +2582,7 @@
           <a:p>
             <a:fld id="{35180F86-B060-4501-977F-882C5FDEC063}" type="datetimeFigureOut">
               <a:rPr lang="en-US" smtClean="0"/>
-              <a:t>3/26/2015</a:t>
+              <a:t>3/27/2015</a:t>
             </a:fld>
             <a:endParaRPr lang="en-US"/>
           </a:p>
@@ -37215,6 +37216,3906 @@
 </p:sld>
 </file>
 
+<file path=ppt/slides/slide19.xml><?xml version="1.0" encoding="utf-8"?>
+<p:sld xmlns:a="http://schemas.openxmlformats.org/drawingml/2006/main" xmlns:r="http://schemas.openxmlformats.org/officeDocument/2006/relationships" xmlns:p="http://schemas.openxmlformats.org/presentationml/2006/main">
+  <p:cSld>
+    <p:spTree>
+      <p:nvGrpSpPr>
+        <p:cNvPr id="1" name=""/>
+        <p:cNvGrpSpPr/>
+        <p:nvPr/>
+      </p:nvGrpSpPr>
+      <p:grpSpPr>
+        <a:xfrm>
+          <a:off x="0" y="0"/>
+          <a:ext cx="0" cy="0"/>
+          <a:chOff x="0" y="0"/>
+          <a:chExt cx="0" cy="0"/>
+        </a:xfrm>
+      </p:grpSpPr>
+      <p:sp>
+        <p:nvSpPr>
+          <p:cNvPr id="2" name="Hexagon 1"/>
+          <p:cNvSpPr/>
+          <p:nvPr/>
+        </p:nvSpPr>
+        <p:spPr>
+          <a:xfrm>
+            <a:off x="2306972" y="260059"/>
+            <a:ext cx="7055141" cy="5922627"/>
+          </a:xfrm>
+          <a:prstGeom prst="hexagon">
+            <a:avLst/>
+          </a:prstGeom>
+          <a:solidFill>
+            <a:srgbClr val="00B0F0"/>
+          </a:solidFill>
+        </p:spPr>
+        <p:style>
+          <a:lnRef idx="2">
+            <a:schemeClr val="dk1"/>
+          </a:lnRef>
+          <a:fillRef idx="1">
+            <a:schemeClr val="lt1"/>
+          </a:fillRef>
+          <a:effectRef idx="0">
+            <a:schemeClr val="dk1"/>
+          </a:effectRef>
+          <a:fontRef idx="minor">
+            <a:schemeClr val="dk1"/>
+          </a:fontRef>
+        </p:style>
+        <p:txBody>
+          <a:bodyPr rtlCol="0" anchor="ctr"/>
+          <a:lstStyle/>
+          <a:p>
+            <a:pPr algn="ctr"/>
+            <a:endParaRPr lang="en-US"/>
+          </a:p>
+        </p:txBody>
+      </p:sp>
+      <p:sp>
+        <p:nvSpPr>
+          <p:cNvPr id="3" name="Hexagon 2"/>
+          <p:cNvSpPr/>
+          <p:nvPr/>
+        </p:nvSpPr>
+        <p:spPr>
+          <a:xfrm rot="5400000">
+            <a:off x="4227868" y="4645742"/>
+            <a:ext cx="1233949" cy="1086464"/>
+          </a:xfrm>
+          <a:prstGeom prst="hexagon">
+            <a:avLst/>
+          </a:prstGeom>
+        </p:spPr>
+        <p:style>
+          <a:lnRef idx="2">
+            <a:schemeClr val="dk1"/>
+          </a:lnRef>
+          <a:fillRef idx="1">
+            <a:schemeClr val="lt1"/>
+          </a:fillRef>
+          <a:effectRef idx="0">
+            <a:schemeClr val="dk1"/>
+          </a:effectRef>
+          <a:fontRef idx="minor">
+            <a:schemeClr val="dk1"/>
+          </a:fontRef>
+        </p:style>
+        <p:txBody>
+          <a:bodyPr rtlCol="0" anchor="ctr"/>
+          <a:lstStyle/>
+          <a:p>
+            <a:pPr algn="ctr"/>
+            <a:endParaRPr lang="en-US"/>
+          </a:p>
+        </p:txBody>
+      </p:sp>
+      <p:sp>
+        <p:nvSpPr>
+          <p:cNvPr id="5" name="Hexagon 4"/>
+          <p:cNvSpPr/>
+          <p:nvPr/>
+        </p:nvSpPr>
+        <p:spPr>
+          <a:xfrm rot="5400000">
+            <a:off x="5314332" y="4645743"/>
+            <a:ext cx="1233949" cy="1086464"/>
+          </a:xfrm>
+          <a:prstGeom prst="hexagon">
+            <a:avLst/>
+          </a:prstGeom>
+        </p:spPr>
+        <p:style>
+          <a:lnRef idx="2">
+            <a:schemeClr val="dk1"/>
+          </a:lnRef>
+          <a:fillRef idx="1">
+            <a:schemeClr val="lt1"/>
+          </a:fillRef>
+          <a:effectRef idx="0">
+            <a:schemeClr val="dk1"/>
+          </a:effectRef>
+          <a:fontRef idx="minor">
+            <a:schemeClr val="dk1"/>
+          </a:fontRef>
+        </p:style>
+        <p:txBody>
+          <a:bodyPr rtlCol="0" anchor="ctr"/>
+          <a:lstStyle/>
+          <a:p>
+            <a:pPr algn="ctr"/>
+            <a:endParaRPr lang="en-US"/>
+          </a:p>
+        </p:txBody>
+      </p:sp>
+      <p:sp>
+        <p:nvSpPr>
+          <p:cNvPr id="6" name="Hexagon 5"/>
+          <p:cNvSpPr/>
+          <p:nvPr/>
+        </p:nvSpPr>
+        <p:spPr>
+          <a:xfrm rot="5400000">
+            <a:off x="6400796" y="4645743"/>
+            <a:ext cx="1233949" cy="1086464"/>
+          </a:xfrm>
+          <a:prstGeom prst="hexagon">
+            <a:avLst/>
+          </a:prstGeom>
+        </p:spPr>
+        <p:style>
+          <a:lnRef idx="2">
+            <a:schemeClr val="dk1"/>
+          </a:lnRef>
+          <a:fillRef idx="1">
+            <a:schemeClr val="lt1"/>
+          </a:fillRef>
+          <a:effectRef idx="0">
+            <a:schemeClr val="dk1"/>
+          </a:effectRef>
+          <a:fontRef idx="minor">
+            <a:schemeClr val="dk1"/>
+          </a:fontRef>
+        </p:style>
+        <p:txBody>
+          <a:bodyPr rtlCol="0" anchor="ctr"/>
+          <a:lstStyle/>
+          <a:p>
+            <a:pPr algn="ctr"/>
+            <a:endParaRPr lang="en-US"/>
+          </a:p>
+        </p:txBody>
+      </p:sp>
+      <p:sp>
+        <p:nvSpPr>
+          <p:cNvPr id="8" name="Hexagon 7"/>
+          <p:cNvSpPr/>
+          <p:nvPr/>
+        </p:nvSpPr>
+        <p:spPr>
+          <a:xfrm rot="5400000">
+            <a:off x="3684634" y="3679722"/>
+            <a:ext cx="1233949" cy="1086464"/>
+          </a:xfrm>
+          <a:prstGeom prst="hexagon">
+            <a:avLst/>
+          </a:prstGeom>
+        </p:spPr>
+        <p:style>
+          <a:lnRef idx="2">
+            <a:schemeClr val="dk1"/>
+          </a:lnRef>
+          <a:fillRef idx="1">
+            <a:schemeClr val="lt1"/>
+          </a:fillRef>
+          <a:effectRef idx="0">
+            <a:schemeClr val="dk1"/>
+          </a:effectRef>
+          <a:fontRef idx="minor">
+            <a:schemeClr val="dk1"/>
+          </a:fontRef>
+        </p:style>
+        <p:txBody>
+          <a:bodyPr rtlCol="0" anchor="ctr"/>
+          <a:lstStyle/>
+          <a:p>
+            <a:pPr algn="ctr"/>
+            <a:endParaRPr lang="en-US"/>
+          </a:p>
+        </p:txBody>
+      </p:sp>
+      <p:sp>
+        <p:nvSpPr>
+          <p:cNvPr id="9" name="Hexagon 8"/>
+          <p:cNvSpPr/>
+          <p:nvPr/>
+        </p:nvSpPr>
+        <p:spPr>
+          <a:xfrm rot="5400000">
+            <a:off x="4773554" y="3687094"/>
+            <a:ext cx="1233949" cy="1086464"/>
+          </a:xfrm>
+          <a:prstGeom prst="hexagon">
+            <a:avLst/>
+          </a:prstGeom>
+        </p:spPr>
+        <p:style>
+          <a:lnRef idx="2">
+            <a:schemeClr val="dk1"/>
+          </a:lnRef>
+          <a:fillRef idx="1">
+            <a:schemeClr val="lt1"/>
+          </a:fillRef>
+          <a:effectRef idx="0">
+            <a:schemeClr val="dk1"/>
+          </a:effectRef>
+          <a:fontRef idx="minor">
+            <a:schemeClr val="dk1"/>
+          </a:fontRef>
+        </p:style>
+        <p:txBody>
+          <a:bodyPr rtlCol="0" anchor="ctr"/>
+          <a:lstStyle/>
+          <a:p>
+            <a:pPr algn="ctr"/>
+            <a:endParaRPr lang="en-US"/>
+          </a:p>
+        </p:txBody>
+      </p:sp>
+      <p:sp>
+        <p:nvSpPr>
+          <p:cNvPr id="10" name="Hexagon 9"/>
+          <p:cNvSpPr/>
+          <p:nvPr/>
+        </p:nvSpPr>
+        <p:spPr>
+          <a:xfrm rot="5400000">
+            <a:off x="5864939" y="3687097"/>
+            <a:ext cx="1233949" cy="1086464"/>
+          </a:xfrm>
+          <a:prstGeom prst="hexagon">
+            <a:avLst/>
+          </a:prstGeom>
+        </p:spPr>
+        <p:style>
+          <a:lnRef idx="2">
+            <a:schemeClr val="dk1"/>
+          </a:lnRef>
+          <a:fillRef idx="1">
+            <a:schemeClr val="lt1"/>
+          </a:fillRef>
+          <a:effectRef idx="0">
+            <a:schemeClr val="dk1"/>
+          </a:effectRef>
+          <a:fontRef idx="minor">
+            <a:schemeClr val="dk1"/>
+          </a:fontRef>
+        </p:style>
+        <p:txBody>
+          <a:bodyPr rtlCol="0" anchor="ctr"/>
+          <a:lstStyle/>
+          <a:p>
+            <a:pPr algn="ctr"/>
+            <a:endParaRPr lang="en-US"/>
+          </a:p>
+        </p:txBody>
+      </p:sp>
+      <p:sp>
+        <p:nvSpPr>
+          <p:cNvPr id="11" name="Hexagon 10"/>
+          <p:cNvSpPr/>
+          <p:nvPr/>
+        </p:nvSpPr>
+        <p:spPr>
+          <a:xfrm rot="5400000">
+            <a:off x="6946497" y="3696927"/>
+            <a:ext cx="1233949" cy="1086464"/>
+          </a:xfrm>
+          <a:prstGeom prst="hexagon">
+            <a:avLst/>
+          </a:prstGeom>
+        </p:spPr>
+        <p:style>
+          <a:lnRef idx="2">
+            <a:schemeClr val="dk1"/>
+          </a:lnRef>
+          <a:fillRef idx="1">
+            <a:schemeClr val="lt1"/>
+          </a:fillRef>
+          <a:effectRef idx="0">
+            <a:schemeClr val="dk1"/>
+          </a:effectRef>
+          <a:fontRef idx="minor">
+            <a:schemeClr val="dk1"/>
+          </a:fontRef>
+        </p:style>
+        <p:txBody>
+          <a:bodyPr rtlCol="0" anchor="ctr"/>
+          <a:lstStyle/>
+          <a:p>
+            <a:pPr algn="ctr"/>
+            <a:endParaRPr lang="en-US"/>
+          </a:p>
+        </p:txBody>
+      </p:sp>
+      <p:sp>
+        <p:nvSpPr>
+          <p:cNvPr id="12" name="Hexagon 11"/>
+          <p:cNvSpPr/>
+          <p:nvPr/>
+        </p:nvSpPr>
+        <p:spPr>
+          <a:xfrm rot="5400000">
+            <a:off x="4262282" y="806237"/>
+            <a:ext cx="1233949" cy="1086464"/>
+          </a:xfrm>
+          <a:prstGeom prst="hexagon">
+            <a:avLst/>
+          </a:prstGeom>
+        </p:spPr>
+        <p:style>
+          <a:lnRef idx="2">
+            <a:schemeClr val="dk1"/>
+          </a:lnRef>
+          <a:fillRef idx="1">
+            <a:schemeClr val="lt1"/>
+          </a:fillRef>
+          <a:effectRef idx="0">
+            <a:schemeClr val="dk1"/>
+          </a:effectRef>
+          <a:fontRef idx="minor">
+            <a:schemeClr val="dk1"/>
+          </a:fontRef>
+        </p:style>
+        <p:txBody>
+          <a:bodyPr rtlCol="0" anchor="ctr"/>
+          <a:lstStyle/>
+          <a:p>
+            <a:pPr algn="ctr"/>
+            <a:endParaRPr lang="en-US"/>
+          </a:p>
+        </p:txBody>
+      </p:sp>
+      <p:sp>
+        <p:nvSpPr>
+          <p:cNvPr id="13" name="Hexagon 12"/>
+          <p:cNvSpPr/>
+          <p:nvPr/>
+        </p:nvSpPr>
+        <p:spPr>
+          <a:xfrm rot="5400000">
+            <a:off x="5348746" y="806238"/>
+            <a:ext cx="1233949" cy="1086464"/>
+          </a:xfrm>
+          <a:prstGeom prst="hexagon">
+            <a:avLst/>
+          </a:prstGeom>
+        </p:spPr>
+        <p:style>
+          <a:lnRef idx="2">
+            <a:schemeClr val="dk1"/>
+          </a:lnRef>
+          <a:fillRef idx="1">
+            <a:schemeClr val="lt1"/>
+          </a:fillRef>
+          <a:effectRef idx="0">
+            <a:schemeClr val="dk1"/>
+          </a:effectRef>
+          <a:fontRef idx="minor">
+            <a:schemeClr val="dk1"/>
+          </a:fontRef>
+        </p:style>
+        <p:txBody>
+          <a:bodyPr rtlCol="0" anchor="ctr"/>
+          <a:lstStyle/>
+          <a:p>
+            <a:pPr algn="ctr"/>
+            <a:endParaRPr lang="en-US"/>
+          </a:p>
+        </p:txBody>
+      </p:sp>
+      <p:sp>
+        <p:nvSpPr>
+          <p:cNvPr id="14" name="Hexagon 13"/>
+          <p:cNvSpPr/>
+          <p:nvPr/>
+        </p:nvSpPr>
+        <p:spPr>
+          <a:xfrm rot="5400000">
+            <a:off x="6435210" y="806238"/>
+            <a:ext cx="1233949" cy="1086464"/>
+          </a:xfrm>
+          <a:prstGeom prst="hexagon">
+            <a:avLst/>
+          </a:prstGeom>
+        </p:spPr>
+        <p:style>
+          <a:lnRef idx="2">
+            <a:schemeClr val="dk1"/>
+          </a:lnRef>
+          <a:fillRef idx="1">
+            <a:schemeClr val="lt1"/>
+          </a:fillRef>
+          <a:effectRef idx="0">
+            <a:schemeClr val="dk1"/>
+          </a:effectRef>
+          <a:fontRef idx="minor">
+            <a:schemeClr val="dk1"/>
+          </a:fontRef>
+        </p:style>
+        <p:txBody>
+          <a:bodyPr rtlCol="0" anchor="ctr"/>
+          <a:lstStyle/>
+          <a:p>
+            <a:pPr algn="ctr"/>
+            <a:endParaRPr lang="en-US"/>
+          </a:p>
+        </p:txBody>
+      </p:sp>
+      <p:sp>
+        <p:nvSpPr>
+          <p:cNvPr id="15" name="Hexagon 14"/>
+          <p:cNvSpPr/>
+          <p:nvPr/>
+        </p:nvSpPr>
+        <p:spPr>
+          <a:xfrm rot="5400000">
+            <a:off x="3719048" y="1757512"/>
+            <a:ext cx="1233949" cy="1086464"/>
+          </a:xfrm>
+          <a:prstGeom prst="hexagon">
+            <a:avLst/>
+          </a:prstGeom>
+        </p:spPr>
+        <p:style>
+          <a:lnRef idx="2">
+            <a:schemeClr val="dk1"/>
+          </a:lnRef>
+          <a:fillRef idx="1">
+            <a:schemeClr val="lt1"/>
+          </a:fillRef>
+          <a:effectRef idx="0">
+            <a:schemeClr val="dk1"/>
+          </a:effectRef>
+          <a:fontRef idx="minor">
+            <a:schemeClr val="dk1"/>
+          </a:fontRef>
+        </p:style>
+        <p:txBody>
+          <a:bodyPr rtlCol="0" anchor="ctr"/>
+          <a:lstStyle/>
+          <a:p>
+            <a:pPr algn="ctr"/>
+            <a:endParaRPr lang="en-US"/>
+          </a:p>
+        </p:txBody>
+      </p:sp>
+      <p:sp>
+        <p:nvSpPr>
+          <p:cNvPr id="16" name="Hexagon 15"/>
+          <p:cNvSpPr/>
+          <p:nvPr/>
+        </p:nvSpPr>
+        <p:spPr>
+          <a:xfrm rot="5400000">
+            <a:off x="4807968" y="1764884"/>
+            <a:ext cx="1233949" cy="1086464"/>
+          </a:xfrm>
+          <a:prstGeom prst="hexagon">
+            <a:avLst/>
+          </a:prstGeom>
+        </p:spPr>
+        <p:style>
+          <a:lnRef idx="2">
+            <a:schemeClr val="dk1"/>
+          </a:lnRef>
+          <a:fillRef idx="1">
+            <a:schemeClr val="lt1"/>
+          </a:fillRef>
+          <a:effectRef idx="0">
+            <a:schemeClr val="dk1"/>
+          </a:effectRef>
+          <a:fontRef idx="minor">
+            <a:schemeClr val="dk1"/>
+          </a:fontRef>
+        </p:style>
+        <p:txBody>
+          <a:bodyPr rtlCol="0" anchor="ctr"/>
+          <a:lstStyle/>
+          <a:p>
+            <a:pPr algn="ctr"/>
+            <a:endParaRPr lang="en-US"/>
+          </a:p>
+        </p:txBody>
+      </p:sp>
+      <p:sp>
+        <p:nvSpPr>
+          <p:cNvPr id="17" name="Hexagon 16"/>
+          <p:cNvSpPr/>
+          <p:nvPr/>
+        </p:nvSpPr>
+        <p:spPr>
+          <a:xfrm rot="5400000">
+            <a:off x="5899353" y="1764887"/>
+            <a:ext cx="1233949" cy="1086464"/>
+          </a:xfrm>
+          <a:prstGeom prst="hexagon">
+            <a:avLst/>
+          </a:prstGeom>
+        </p:spPr>
+        <p:style>
+          <a:lnRef idx="2">
+            <a:schemeClr val="dk1"/>
+          </a:lnRef>
+          <a:fillRef idx="1">
+            <a:schemeClr val="lt1"/>
+          </a:fillRef>
+          <a:effectRef idx="0">
+            <a:schemeClr val="dk1"/>
+          </a:effectRef>
+          <a:fontRef idx="minor">
+            <a:schemeClr val="dk1"/>
+          </a:fontRef>
+        </p:style>
+        <p:txBody>
+          <a:bodyPr rtlCol="0" anchor="ctr"/>
+          <a:lstStyle/>
+          <a:p>
+            <a:pPr algn="ctr"/>
+            <a:endParaRPr lang="en-US"/>
+          </a:p>
+        </p:txBody>
+      </p:sp>
+      <p:sp>
+        <p:nvSpPr>
+          <p:cNvPr id="18" name="Hexagon 17"/>
+          <p:cNvSpPr/>
+          <p:nvPr/>
+        </p:nvSpPr>
+        <p:spPr>
+          <a:xfrm rot="5400000">
+            <a:off x="6980911" y="1774717"/>
+            <a:ext cx="1233949" cy="1086464"/>
+          </a:xfrm>
+          <a:prstGeom prst="hexagon">
+            <a:avLst/>
+          </a:prstGeom>
+        </p:spPr>
+        <p:style>
+          <a:lnRef idx="2">
+            <a:schemeClr val="dk1"/>
+          </a:lnRef>
+          <a:fillRef idx="1">
+            <a:schemeClr val="lt1"/>
+          </a:fillRef>
+          <a:effectRef idx="0">
+            <a:schemeClr val="dk1"/>
+          </a:effectRef>
+          <a:fontRef idx="minor">
+            <a:schemeClr val="dk1"/>
+          </a:fontRef>
+        </p:style>
+        <p:txBody>
+          <a:bodyPr rtlCol="0" anchor="ctr"/>
+          <a:lstStyle/>
+          <a:p>
+            <a:pPr algn="ctr"/>
+            <a:endParaRPr lang="en-US"/>
+          </a:p>
+        </p:txBody>
+      </p:sp>
+      <p:sp>
+        <p:nvSpPr>
+          <p:cNvPr id="19" name="Hexagon 18"/>
+          <p:cNvSpPr/>
+          <p:nvPr/>
+        </p:nvSpPr>
+        <p:spPr>
+          <a:xfrm rot="5400000">
+            <a:off x="3153694" y="2716155"/>
+            <a:ext cx="1233949" cy="1086464"/>
+          </a:xfrm>
+          <a:prstGeom prst="hexagon">
+            <a:avLst/>
+          </a:prstGeom>
+        </p:spPr>
+        <p:style>
+          <a:lnRef idx="2">
+            <a:schemeClr val="dk1"/>
+          </a:lnRef>
+          <a:fillRef idx="1">
+            <a:schemeClr val="lt1"/>
+          </a:fillRef>
+          <a:effectRef idx="0">
+            <a:schemeClr val="dk1"/>
+          </a:effectRef>
+          <a:fontRef idx="minor">
+            <a:schemeClr val="dk1"/>
+          </a:fontRef>
+        </p:style>
+        <p:txBody>
+          <a:bodyPr rtlCol="0" anchor="ctr"/>
+          <a:lstStyle/>
+          <a:p>
+            <a:pPr algn="ctr"/>
+            <a:endParaRPr lang="en-US"/>
+          </a:p>
+        </p:txBody>
+      </p:sp>
+      <p:sp>
+        <p:nvSpPr>
+          <p:cNvPr id="20" name="Hexagon 19"/>
+          <p:cNvSpPr/>
+          <p:nvPr/>
+        </p:nvSpPr>
+        <p:spPr>
+          <a:xfrm rot="5400000">
+            <a:off x="4242614" y="2723527"/>
+            <a:ext cx="1233949" cy="1086464"/>
+          </a:xfrm>
+          <a:prstGeom prst="hexagon">
+            <a:avLst/>
+          </a:prstGeom>
+        </p:spPr>
+        <p:style>
+          <a:lnRef idx="2">
+            <a:schemeClr val="dk1"/>
+          </a:lnRef>
+          <a:fillRef idx="1">
+            <a:schemeClr val="lt1"/>
+          </a:fillRef>
+          <a:effectRef idx="0">
+            <a:schemeClr val="dk1"/>
+          </a:effectRef>
+          <a:fontRef idx="minor">
+            <a:schemeClr val="dk1"/>
+          </a:fontRef>
+        </p:style>
+        <p:txBody>
+          <a:bodyPr rtlCol="0" anchor="ctr"/>
+          <a:lstStyle/>
+          <a:p>
+            <a:pPr algn="ctr"/>
+            <a:endParaRPr lang="en-US"/>
+          </a:p>
+        </p:txBody>
+      </p:sp>
+      <p:sp>
+        <p:nvSpPr>
+          <p:cNvPr id="21" name="Hexagon 20"/>
+          <p:cNvSpPr/>
+          <p:nvPr/>
+        </p:nvSpPr>
+        <p:spPr>
+          <a:xfrm rot="5400000">
+            <a:off x="5333999" y="2723530"/>
+            <a:ext cx="1233949" cy="1086464"/>
+          </a:xfrm>
+          <a:prstGeom prst="hexagon">
+            <a:avLst/>
+          </a:prstGeom>
+        </p:spPr>
+        <p:style>
+          <a:lnRef idx="2">
+            <a:schemeClr val="dk1"/>
+          </a:lnRef>
+          <a:fillRef idx="1">
+            <a:schemeClr val="lt1"/>
+          </a:fillRef>
+          <a:effectRef idx="0">
+            <a:schemeClr val="dk1"/>
+          </a:effectRef>
+          <a:fontRef idx="minor">
+            <a:schemeClr val="dk1"/>
+          </a:fontRef>
+        </p:style>
+        <p:txBody>
+          <a:bodyPr rtlCol="0" anchor="ctr"/>
+          <a:lstStyle/>
+          <a:p>
+            <a:pPr algn="ctr"/>
+            <a:endParaRPr lang="en-US"/>
+          </a:p>
+        </p:txBody>
+      </p:sp>
+      <p:sp>
+        <p:nvSpPr>
+          <p:cNvPr id="22" name="Hexagon 21"/>
+          <p:cNvSpPr/>
+          <p:nvPr/>
+        </p:nvSpPr>
+        <p:spPr>
+          <a:xfrm rot="5400000">
+            <a:off x="6415557" y="2733360"/>
+            <a:ext cx="1233949" cy="1086464"/>
+          </a:xfrm>
+          <a:prstGeom prst="hexagon">
+            <a:avLst/>
+          </a:prstGeom>
+        </p:spPr>
+        <p:style>
+          <a:lnRef idx="2">
+            <a:schemeClr val="dk1"/>
+          </a:lnRef>
+          <a:fillRef idx="1">
+            <a:schemeClr val="lt1"/>
+          </a:fillRef>
+          <a:effectRef idx="0">
+            <a:schemeClr val="dk1"/>
+          </a:effectRef>
+          <a:fontRef idx="minor">
+            <a:schemeClr val="dk1"/>
+          </a:fontRef>
+        </p:style>
+        <p:txBody>
+          <a:bodyPr rtlCol="0" anchor="ctr"/>
+          <a:lstStyle/>
+          <a:p>
+            <a:pPr algn="ctr"/>
+            <a:endParaRPr lang="en-US"/>
+          </a:p>
+        </p:txBody>
+      </p:sp>
+      <p:sp>
+        <p:nvSpPr>
+          <p:cNvPr id="23" name="Hexagon 22"/>
+          <p:cNvSpPr/>
+          <p:nvPr/>
+        </p:nvSpPr>
+        <p:spPr>
+          <a:xfrm rot="5400000">
+            <a:off x="7516771" y="2743193"/>
+            <a:ext cx="1233949" cy="1086464"/>
+          </a:xfrm>
+          <a:prstGeom prst="hexagon">
+            <a:avLst/>
+          </a:prstGeom>
+        </p:spPr>
+        <p:style>
+          <a:lnRef idx="2">
+            <a:schemeClr val="dk1"/>
+          </a:lnRef>
+          <a:fillRef idx="1">
+            <a:schemeClr val="lt1"/>
+          </a:fillRef>
+          <a:effectRef idx="0">
+            <a:schemeClr val="dk1"/>
+          </a:effectRef>
+          <a:fontRef idx="minor">
+            <a:schemeClr val="dk1"/>
+          </a:fontRef>
+        </p:style>
+        <p:txBody>
+          <a:bodyPr rtlCol="0" anchor="ctr"/>
+          <a:lstStyle/>
+          <a:p>
+            <a:pPr algn="ctr"/>
+            <a:endParaRPr lang="en-US"/>
+          </a:p>
+        </p:txBody>
+      </p:sp>
+      <p:pic>
+        <p:nvPicPr>
+          <p:cNvPr id="2050" name="Picture 2" descr="http://cf.geekdo-images.com/images/pic350474_t.jpg"/>
+          <p:cNvPicPr>
+            <a:picLocks noChangeAspect="1" noChangeArrowheads="1"/>
+          </p:cNvPicPr>
+          <p:nvPr/>
+        </p:nvPicPr>
+        <p:blipFill rotWithShape="1">
+          <a:blip r:embed="rId2">
+            <a:extLst>
+              <a:ext uri="{28A0092B-C50C-407E-A947-70E740481C1C}">
+                <a14:useLocalDpi xmlns:a14="http://schemas.microsoft.com/office/drawing/2010/main" val="0"/>
+              </a:ext>
+            </a:extLst>
+          </a:blip>
+          <a:srcRect t="50524" r="78988"/>
+          <a:stretch/>
+        </p:blipFill>
+        <p:spPr bwMode="auto">
+          <a:xfrm rot="1664485">
+            <a:off x="4277190" y="5623607"/>
+            <a:ext cx="313578" cy="350729"/>
+          </a:xfrm>
+          <a:prstGeom prst="rect">
+            <a:avLst/>
+          </a:prstGeom>
+          <a:noFill/>
+          <a:extLst>
+            <a:ext uri="{909E8E84-426E-40DD-AFC4-6F175D3DCCD1}">
+              <a14:hiddenFill xmlns:a14="http://schemas.microsoft.com/office/drawing/2010/main">
+                <a:solidFill>
+                  <a:srgbClr val="FFFFFF"/>
+                </a:solidFill>
+              </a14:hiddenFill>
+            </a:ext>
+          </a:extLst>
+        </p:spPr>
+      </p:pic>
+      <p:pic>
+        <p:nvPicPr>
+          <p:cNvPr id="2054" name="Picture 6" descr="http://cf.geekdo-images.com/images/pic350474_t.jpg"/>
+          <p:cNvPicPr>
+            <a:picLocks noChangeAspect="1" noChangeArrowheads="1"/>
+          </p:cNvPicPr>
+          <p:nvPr/>
+        </p:nvPicPr>
+        <p:blipFill rotWithShape="1">
+          <a:blip r:embed="rId3">
+            <a:extLst>
+              <a:ext uri="{28A0092B-C50C-407E-A947-70E740481C1C}">
+                <a14:useLocalDpi xmlns:a14="http://schemas.microsoft.com/office/drawing/2010/main" val="0"/>
+              </a:ext>
+            </a:extLst>
+          </a:blip>
+          <a:srcRect l="19088" t="4041" r="59662" b="47011"/>
+          <a:stretch/>
+        </p:blipFill>
+        <p:spPr bwMode="auto">
+          <a:xfrm rot="19270515">
+            <a:off x="6222308" y="5577515"/>
+            <a:ext cx="404812" cy="442912"/>
+          </a:xfrm>
+          <a:prstGeom prst="rect">
+            <a:avLst/>
+          </a:prstGeom>
+          <a:noFill/>
+          <a:extLst>
+            <a:ext uri="{909E8E84-426E-40DD-AFC4-6F175D3DCCD1}">
+              <a14:hiddenFill xmlns:a14="http://schemas.microsoft.com/office/drawing/2010/main">
+                <a:solidFill>
+                  <a:srgbClr val="FFFFFF"/>
+                </a:solidFill>
+              </a14:hiddenFill>
+            </a:ext>
+          </a:extLst>
+        </p:spPr>
+      </p:pic>
+      <p:pic>
+        <p:nvPicPr>
+          <p:cNvPr id="30" name="Picture 6" descr="http://cf.geekdo-images.com/images/pic350474_t.jpg"/>
+          <p:cNvPicPr>
+            <a:picLocks noChangeAspect="1" noChangeArrowheads="1"/>
+          </p:cNvPicPr>
+          <p:nvPr/>
+        </p:nvPicPr>
+        <p:blipFill rotWithShape="1">
+          <a:blip r:embed="rId4">
+            <a:extLst>
+              <a:ext uri="{28A0092B-C50C-407E-A947-70E740481C1C}">
+                <a14:useLocalDpi xmlns:a14="http://schemas.microsoft.com/office/drawing/2010/main" val="0"/>
+              </a:ext>
+            </a:extLst>
+          </a:blip>
+          <a:srcRect l="76588" b="47589"/>
+          <a:stretch/>
+        </p:blipFill>
+        <p:spPr bwMode="auto">
+          <a:xfrm rot="5633247">
+            <a:off x="3255640" y="4004660"/>
+            <a:ext cx="445998" cy="474255"/>
+          </a:xfrm>
+          <a:prstGeom prst="rect">
+            <a:avLst/>
+          </a:prstGeom>
+          <a:noFill/>
+          <a:extLst>
+            <a:ext uri="{909E8E84-426E-40DD-AFC4-6F175D3DCCD1}">
+              <a14:hiddenFill xmlns:a14="http://schemas.microsoft.com/office/drawing/2010/main">
+                <a:solidFill>
+                  <a:srgbClr val="FFFFFF"/>
+                </a:solidFill>
+              </a14:hiddenFill>
+            </a:ext>
+          </a:extLst>
+        </p:spPr>
+      </p:pic>
+      <p:pic>
+        <p:nvPicPr>
+          <p:cNvPr id="31" name="Picture 6" descr="http://cf.geekdo-images.com/images/pic350474_t.jpg"/>
+          <p:cNvPicPr>
+            <a:picLocks noChangeAspect="1" noChangeArrowheads="1"/>
+          </p:cNvPicPr>
+          <p:nvPr/>
+        </p:nvPicPr>
+        <p:blipFill rotWithShape="1">
+          <a:blip r:embed="rId5">
+            <a:extLst>
+              <a:ext uri="{28A0092B-C50C-407E-A947-70E740481C1C}">
+                <a14:useLocalDpi xmlns:a14="http://schemas.microsoft.com/office/drawing/2010/main" val="0"/>
+              </a:ext>
+            </a:extLst>
+          </a:blip>
+          <a:srcRect l="38531" r="40219" b="46603"/>
+          <a:stretch/>
+        </p:blipFill>
+        <p:spPr bwMode="auto">
+          <a:xfrm rot="19850124">
+            <a:off x="7763064" y="4664998"/>
+            <a:ext cx="404812" cy="483171"/>
+          </a:xfrm>
+          <a:prstGeom prst="rect">
+            <a:avLst/>
+          </a:prstGeom>
+          <a:noFill/>
+          <a:extLst>
+            <a:ext uri="{909E8E84-426E-40DD-AFC4-6F175D3DCCD1}">
+              <a14:hiddenFill xmlns:a14="http://schemas.microsoft.com/office/drawing/2010/main">
+                <a:solidFill>
+                  <a:srgbClr val="FFFFFF"/>
+                </a:solidFill>
+              </a14:hiddenFill>
+            </a:ext>
+          </a:extLst>
+        </p:spPr>
+      </p:pic>
+      <p:pic>
+        <p:nvPicPr>
+          <p:cNvPr id="33" name="Picture 6" descr="http://cf.geekdo-images.com/images/pic350474_t.jpg"/>
+          <p:cNvPicPr>
+            <a:picLocks noChangeAspect="1" noChangeArrowheads="1"/>
+          </p:cNvPicPr>
+          <p:nvPr/>
+        </p:nvPicPr>
+        <p:blipFill rotWithShape="1">
+          <a:blip r:embed="rId6">
+            <a:extLst>
+              <a:ext uri="{28A0092B-C50C-407E-A947-70E740481C1C}">
+                <a14:useLocalDpi xmlns:a14="http://schemas.microsoft.com/office/drawing/2010/main" val="0"/>
+              </a:ext>
+            </a:extLst>
+          </a:blip>
+          <a:srcRect l="58113" r="19887" b="47538"/>
+          <a:stretch/>
+        </p:blipFill>
+        <p:spPr bwMode="auto">
+          <a:xfrm rot="6031406">
+            <a:off x="3353069" y="2092246"/>
+            <a:ext cx="419100" cy="474717"/>
+          </a:xfrm>
+          <a:prstGeom prst="rect">
+            <a:avLst/>
+          </a:prstGeom>
+          <a:noFill/>
+          <a:extLst>
+            <a:ext uri="{909E8E84-426E-40DD-AFC4-6F175D3DCCD1}">
+              <a14:hiddenFill xmlns:a14="http://schemas.microsoft.com/office/drawing/2010/main">
+                <a:solidFill>
+                  <a:srgbClr val="FFFFFF"/>
+                </a:solidFill>
+              </a14:hiddenFill>
+            </a:ext>
+          </a:extLst>
+        </p:spPr>
+      </p:pic>
+      <p:pic>
+        <p:nvPicPr>
+          <p:cNvPr id="34" name="Picture 2" descr="http://cf.geekdo-images.com/images/pic350474_t.jpg"/>
+          <p:cNvPicPr>
+            <a:picLocks noChangeAspect="1" noChangeArrowheads="1"/>
+          </p:cNvPicPr>
+          <p:nvPr/>
+        </p:nvPicPr>
+        <p:blipFill rotWithShape="1">
+          <a:blip r:embed="rId2">
+            <a:extLst>
+              <a:ext uri="{28A0092B-C50C-407E-A947-70E740481C1C}">
+                <a14:useLocalDpi xmlns:a14="http://schemas.microsoft.com/office/drawing/2010/main" val="0"/>
+              </a:ext>
+            </a:extLst>
+          </a:blip>
+          <a:srcRect t="50524" r="78988"/>
+          <a:stretch/>
+        </p:blipFill>
+        <p:spPr bwMode="auto">
+          <a:xfrm rot="8774560">
+            <a:off x="4304201" y="559551"/>
+            <a:ext cx="313578" cy="350729"/>
+          </a:xfrm>
+          <a:prstGeom prst="rect">
+            <a:avLst/>
+          </a:prstGeom>
+          <a:noFill/>
+          <a:extLst>
+            <a:ext uri="{909E8E84-426E-40DD-AFC4-6F175D3DCCD1}">
+              <a14:hiddenFill xmlns:a14="http://schemas.microsoft.com/office/drawing/2010/main">
+                <a:solidFill>
+                  <a:srgbClr val="FFFFFF"/>
+                </a:solidFill>
+              </a14:hiddenFill>
+            </a:ext>
+          </a:extLst>
+        </p:spPr>
+      </p:pic>
+      <p:pic>
+        <p:nvPicPr>
+          <p:cNvPr id="35" name="Picture 6" descr="http://cf.geekdo-images.com/images/pic350474_t.jpg"/>
+          <p:cNvPicPr>
+            <a:picLocks noChangeAspect="1" noChangeArrowheads="1"/>
+          </p:cNvPicPr>
+          <p:nvPr/>
+        </p:nvPicPr>
+        <p:blipFill rotWithShape="1">
+          <a:blip r:embed="rId7">
+            <a:extLst>
+              <a:ext uri="{28A0092B-C50C-407E-A947-70E740481C1C}">
+                <a14:useLocalDpi xmlns:a14="http://schemas.microsoft.com/office/drawing/2010/main" val="0"/>
+              </a:ext>
+            </a:extLst>
+          </a:blip>
+          <a:srcRect r="79812" b="47193"/>
+          <a:stretch/>
+        </p:blipFill>
+        <p:spPr bwMode="auto">
+          <a:xfrm rot="12526485">
+            <a:off x="6137222" y="415703"/>
+            <a:ext cx="384571" cy="477838"/>
+          </a:xfrm>
+          <a:prstGeom prst="rect">
+            <a:avLst/>
+          </a:prstGeom>
+          <a:noFill/>
+          <a:extLst>
+            <a:ext uri="{909E8E84-426E-40DD-AFC4-6F175D3DCCD1}">
+              <a14:hiddenFill xmlns:a14="http://schemas.microsoft.com/office/drawing/2010/main">
+                <a:solidFill>
+                  <a:srgbClr val="FFFFFF"/>
+                </a:solidFill>
+              </a14:hiddenFill>
+            </a:ext>
+          </a:extLst>
+        </p:spPr>
+      </p:pic>
+      <p:pic>
+        <p:nvPicPr>
+          <p:cNvPr id="36" name="Picture 2" descr="http://cf.geekdo-images.com/images/pic350474_t.jpg"/>
+          <p:cNvPicPr>
+            <a:picLocks noChangeAspect="1" noChangeArrowheads="1"/>
+          </p:cNvPicPr>
+          <p:nvPr/>
+        </p:nvPicPr>
+        <p:blipFill rotWithShape="1">
+          <a:blip r:embed="rId2">
+            <a:extLst>
+              <a:ext uri="{28A0092B-C50C-407E-A947-70E740481C1C}">
+                <a14:useLocalDpi xmlns:a14="http://schemas.microsoft.com/office/drawing/2010/main" val="0"/>
+              </a:ext>
+            </a:extLst>
+          </a:blip>
+          <a:srcRect t="50524" r="78988"/>
+          <a:stretch/>
+        </p:blipFill>
+        <p:spPr bwMode="auto">
+          <a:xfrm rot="12272717">
+            <a:off x="7796727" y="1490148"/>
+            <a:ext cx="313578" cy="350729"/>
+          </a:xfrm>
+          <a:prstGeom prst="rect">
+            <a:avLst/>
+          </a:prstGeom>
+          <a:noFill/>
+          <a:extLst>
+            <a:ext uri="{909E8E84-426E-40DD-AFC4-6F175D3DCCD1}">
+              <a14:hiddenFill xmlns:a14="http://schemas.microsoft.com/office/drawing/2010/main">
+                <a:solidFill>
+                  <a:srgbClr val="FFFFFF"/>
+                </a:solidFill>
+              </a14:hiddenFill>
+            </a:ext>
+          </a:extLst>
+        </p:spPr>
+      </p:pic>
+      <p:pic>
+        <p:nvPicPr>
+          <p:cNvPr id="37" name="Picture 2" descr="http://cf.geekdo-images.com/images/pic350474_t.jpg"/>
+          <p:cNvPicPr>
+            <a:picLocks noChangeAspect="1" noChangeArrowheads="1"/>
+          </p:cNvPicPr>
+          <p:nvPr/>
+        </p:nvPicPr>
+        <p:blipFill rotWithShape="1">
+          <a:blip r:embed="rId2">
+            <a:extLst>
+              <a:ext uri="{28A0092B-C50C-407E-A947-70E740481C1C}">
+                <a14:useLocalDpi xmlns:a14="http://schemas.microsoft.com/office/drawing/2010/main" val="0"/>
+              </a:ext>
+            </a:extLst>
+          </a:blip>
+          <a:srcRect t="50524" r="78988"/>
+          <a:stretch/>
+        </p:blipFill>
+        <p:spPr bwMode="auto">
+          <a:xfrm rot="16511104">
+            <a:off x="8707422" y="3111061"/>
+            <a:ext cx="313578" cy="350729"/>
+          </a:xfrm>
+          <a:prstGeom prst="rect">
+            <a:avLst/>
+          </a:prstGeom>
+          <a:noFill/>
+          <a:extLst>
+            <a:ext uri="{909E8E84-426E-40DD-AFC4-6F175D3DCCD1}">
+              <a14:hiddenFill xmlns:a14="http://schemas.microsoft.com/office/drawing/2010/main">
+                <a:solidFill>
+                  <a:srgbClr val="FFFFFF"/>
+                </a:solidFill>
+              </a14:hiddenFill>
+            </a:ext>
+          </a:extLst>
+        </p:spPr>
+      </p:pic>
+      <p:pic>
+        <p:nvPicPr>
+          <p:cNvPr id="4098" name="Picture 2" descr="https://tucsonhorse.files.wordpress.com/2012/10/img_2791.jpg"/>
+          <p:cNvPicPr>
+            <a:picLocks noChangeAspect="1" noChangeArrowheads="1"/>
+          </p:cNvPicPr>
+          <p:nvPr/>
+        </p:nvPicPr>
+        <p:blipFill rotWithShape="1">
+          <a:blip r:embed="rId8" cstate="print">
+            <a:extLst>
+              <a:ext uri="{28A0092B-C50C-407E-A947-70E740481C1C}">
+                <a14:useLocalDpi xmlns:a14="http://schemas.microsoft.com/office/drawing/2010/main" val="0"/>
+              </a:ext>
+            </a:extLst>
+          </a:blip>
+          <a:srcRect l="9345" t="47173" r="51931" b="5313"/>
+          <a:stretch/>
+        </p:blipFill>
+        <p:spPr bwMode="auto">
+          <a:xfrm rot="5400000">
+            <a:off x="6431666" y="793220"/>
+            <a:ext cx="1260042" cy="1159549"/>
+          </a:xfrm>
+          <a:prstGeom prst="rect">
+            <a:avLst/>
+          </a:prstGeom>
+          <a:noFill/>
+          <a:extLst>
+            <a:ext uri="{909E8E84-426E-40DD-AFC4-6F175D3DCCD1}">
+              <a14:hiddenFill xmlns:a14="http://schemas.microsoft.com/office/drawing/2010/main">
+                <a:solidFill>
+                  <a:srgbClr val="FFFFFF"/>
+                </a:solidFill>
+              </a14:hiddenFill>
+            </a:ext>
+          </a:extLst>
+        </p:spPr>
+      </p:pic>
+      <p:pic>
+        <p:nvPicPr>
+          <p:cNvPr id="32" name="Picture 2" descr="https://tucsonhorse.files.wordpress.com/2012/10/img_2791.jpg"/>
+          <p:cNvPicPr>
+            <a:picLocks noChangeAspect="1" noChangeArrowheads="1"/>
+          </p:cNvPicPr>
+          <p:nvPr/>
+        </p:nvPicPr>
+        <p:blipFill rotWithShape="1">
+          <a:blip r:embed="rId9" cstate="print">
+            <a:extLst>
+              <a:ext uri="{28A0092B-C50C-407E-A947-70E740481C1C}">
+                <a14:useLocalDpi xmlns:a14="http://schemas.microsoft.com/office/drawing/2010/main" val="0"/>
+              </a:ext>
+            </a:extLst>
+          </a:blip>
+          <a:srcRect l="9487" t="3061" r="50740" b="50375"/>
+          <a:stretch/>
+        </p:blipFill>
+        <p:spPr bwMode="auto">
+          <a:xfrm rot="5400000">
+            <a:off x="5302442" y="754711"/>
+            <a:ext cx="1318893" cy="1158053"/>
+          </a:xfrm>
+          <a:prstGeom prst="rect">
+            <a:avLst/>
+          </a:prstGeom>
+          <a:noFill/>
+          <a:extLst>
+            <a:ext uri="{909E8E84-426E-40DD-AFC4-6F175D3DCCD1}">
+              <a14:hiddenFill xmlns:a14="http://schemas.microsoft.com/office/drawing/2010/main">
+                <a:solidFill>
+                  <a:srgbClr val="FFFFFF"/>
+                </a:solidFill>
+              </a14:hiddenFill>
+            </a:ext>
+          </a:extLst>
+        </p:spPr>
+      </p:pic>
+      <p:pic>
+        <p:nvPicPr>
+          <p:cNvPr id="38" name="Picture 2" descr="https://tucsonhorse.files.wordpress.com/2012/10/img_2791.jpg"/>
+          <p:cNvPicPr>
+            <a:picLocks noChangeAspect="1" noChangeArrowheads="1"/>
+          </p:cNvPicPr>
+          <p:nvPr/>
+        </p:nvPicPr>
+        <p:blipFill rotWithShape="1">
+          <a:blip r:embed="rId10" cstate="print">
+            <a:extLst>
+              <a:ext uri="{28A0092B-C50C-407E-A947-70E740481C1C}">
+                <a14:useLocalDpi xmlns:a14="http://schemas.microsoft.com/office/drawing/2010/main" val="0"/>
+              </a:ext>
+            </a:extLst>
+          </a:blip>
+          <a:srcRect l="46242" t="47969" r="13134" b="4200"/>
+          <a:stretch/>
+        </p:blipFill>
+        <p:spPr bwMode="auto">
+          <a:xfrm rot="5400000">
+            <a:off x="6911536" y="1705059"/>
+            <a:ext cx="1360081" cy="1201007"/>
+          </a:xfrm>
+          <a:prstGeom prst="rect">
+            <a:avLst/>
+          </a:prstGeom>
+          <a:noFill/>
+          <a:extLst>
+            <a:ext uri="{909E8E84-426E-40DD-AFC4-6F175D3DCCD1}">
+              <a14:hiddenFill xmlns:a14="http://schemas.microsoft.com/office/drawing/2010/main">
+                <a:solidFill>
+                  <a:srgbClr val="FFFFFF"/>
+                </a:solidFill>
+              </a14:hiddenFill>
+            </a:ext>
+          </a:extLst>
+        </p:spPr>
+      </p:pic>
+      <p:pic>
+        <p:nvPicPr>
+          <p:cNvPr id="39" name="Picture 2" descr="https://tucsonhorse.files.wordpress.com/2012/10/img_2791.jpg"/>
+          <p:cNvPicPr>
+            <a:picLocks noChangeAspect="1" noChangeArrowheads="1"/>
+          </p:cNvPicPr>
+          <p:nvPr/>
+        </p:nvPicPr>
+        <p:blipFill rotWithShape="1">
+          <a:blip r:embed="rId11" cstate="print">
+            <a:extLst>
+              <a:ext uri="{28A0092B-C50C-407E-A947-70E740481C1C}">
+                <a14:useLocalDpi xmlns:a14="http://schemas.microsoft.com/office/drawing/2010/main" val="0"/>
+              </a:ext>
+            </a:extLst>
+          </a:blip>
+          <a:srcRect l="48696" r="11629" b="49103"/>
+          <a:stretch/>
+        </p:blipFill>
+        <p:spPr bwMode="auto">
+          <a:xfrm rot="5400000">
+            <a:off x="4247406" y="2652548"/>
+            <a:ext cx="1282850" cy="1234306"/>
+          </a:xfrm>
+          <a:prstGeom prst="rect">
+            <a:avLst/>
+          </a:prstGeom>
+          <a:noFill/>
+          <a:extLst>
+            <a:ext uri="{909E8E84-426E-40DD-AFC4-6F175D3DCCD1}">
+              <a14:hiddenFill xmlns:a14="http://schemas.microsoft.com/office/drawing/2010/main">
+                <a:solidFill>
+                  <a:srgbClr val="FFFFFF"/>
+                </a:solidFill>
+              </a14:hiddenFill>
+            </a:ext>
+          </a:extLst>
+        </p:spPr>
+      </p:pic>
+      <p:pic>
+        <p:nvPicPr>
+          <p:cNvPr id="40" name="Picture 2" descr="https://tucsonhorse.files.wordpress.com/2012/10/img_2791.jpg"/>
+          <p:cNvPicPr>
+            <a:picLocks noChangeAspect="1" noChangeArrowheads="1"/>
+          </p:cNvPicPr>
+          <p:nvPr/>
+        </p:nvPicPr>
+        <p:blipFill rotWithShape="1">
+          <a:blip r:embed="rId12" cstate="print">
+            <a:extLst>
+              <a:ext uri="{28A0092B-C50C-407E-A947-70E740481C1C}">
+                <a14:useLocalDpi xmlns:a14="http://schemas.microsoft.com/office/drawing/2010/main" val="0"/>
+              </a:ext>
+            </a:extLst>
+          </a:blip>
+          <a:srcRect l="46242" t="47969" r="13134" b="4200"/>
+          <a:stretch/>
+        </p:blipFill>
+        <p:spPr bwMode="auto">
+          <a:xfrm rot="5400000">
+            <a:off x="4217599" y="752282"/>
+            <a:ext cx="1333607" cy="1177629"/>
+          </a:xfrm>
+          <a:prstGeom prst="rect">
+            <a:avLst/>
+          </a:prstGeom>
+          <a:noFill/>
+          <a:extLst>
+            <a:ext uri="{909E8E84-426E-40DD-AFC4-6F175D3DCCD1}">
+              <a14:hiddenFill xmlns:a14="http://schemas.microsoft.com/office/drawing/2010/main">
+                <a:solidFill>
+                  <a:srgbClr val="FFFFFF"/>
+                </a:solidFill>
+              </a14:hiddenFill>
+            </a:ext>
+          </a:extLst>
+        </p:spPr>
+      </p:pic>
+      <p:pic>
+        <p:nvPicPr>
+          <p:cNvPr id="41" name="Picture 2" descr="https://tucsonhorse.files.wordpress.com/2012/10/img_2791.jpg"/>
+          <p:cNvPicPr>
+            <a:picLocks noChangeAspect="1" noChangeArrowheads="1"/>
+          </p:cNvPicPr>
+          <p:nvPr/>
+        </p:nvPicPr>
+        <p:blipFill rotWithShape="1">
+          <a:blip r:embed="rId13" cstate="print">
+            <a:extLst>
+              <a:ext uri="{28A0092B-C50C-407E-A947-70E740481C1C}">
+                <a14:useLocalDpi xmlns:a14="http://schemas.microsoft.com/office/drawing/2010/main" val="0"/>
+              </a:ext>
+            </a:extLst>
+          </a:blip>
+          <a:srcRect l="9487" t="3061" r="50740" b="50375"/>
+          <a:stretch/>
+        </p:blipFill>
+        <p:spPr bwMode="auto">
+          <a:xfrm rot="5400000">
+            <a:off x="3150312" y="2700813"/>
+            <a:ext cx="1270206" cy="1115303"/>
+          </a:xfrm>
+          <a:prstGeom prst="rect">
+            <a:avLst/>
+          </a:prstGeom>
+          <a:noFill/>
+          <a:extLst>
+            <a:ext uri="{909E8E84-426E-40DD-AFC4-6F175D3DCCD1}">
+              <a14:hiddenFill xmlns:a14="http://schemas.microsoft.com/office/drawing/2010/main">
+                <a:solidFill>
+                  <a:srgbClr val="FFFFFF"/>
+                </a:solidFill>
+              </a14:hiddenFill>
+            </a:ext>
+          </a:extLst>
+        </p:spPr>
+      </p:pic>
+      <p:pic>
+        <p:nvPicPr>
+          <p:cNvPr id="4100" name="Picture 4" descr="http://media.firebox.com/pic/p2612_extra8.jpg"/>
+          <p:cNvPicPr>
+            <a:picLocks noChangeAspect="1" noChangeArrowheads="1"/>
+          </p:cNvPicPr>
+          <p:nvPr/>
+        </p:nvPicPr>
+        <p:blipFill>
+          <a:blip r:embed="rId14">
+            <a:extLst>
+              <a:ext uri="{28A0092B-C50C-407E-A947-70E740481C1C}">
+                <a14:useLocalDpi xmlns:a14="http://schemas.microsoft.com/office/drawing/2010/main" val="0"/>
+              </a:ext>
+            </a:extLst>
+          </a:blip>
+          <a:srcRect/>
+          <a:stretch>
+            <a:fillRect/>
+          </a:stretch>
+        </p:blipFill>
+        <p:spPr bwMode="auto">
+          <a:xfrm rot="5400000">
+            <a:off x="5847785" y="1730623"/>
+            <a:ext cx="1303632" cy="1149439"/>
+          </a:xfrm>
+          <a:prstGeom prst="rect">
+            <a:avLst/>
+          </a:prstGeom>
+          <a:noFill/>
+          <a:extLst>
+            <a:ext uri="{909E8E84-426E-40DD-AFC4-6F175D3DCCD1}">
+              <a14:hiddenFill xmlns:a14="http://schemas.microsoft.com/office/drawing/2010/main">
+                <a:solidFill>
+                  <a:srgbClr val="FFFFFF"/>
+                </a:solidFill>
+              </a14:hiddenFill>
+            </a:ext>
+          </a:extLst>
+        </p:spPr>
+      </p:pic>
+      <p:pic>
+        <p:nvPicPr>
+          <p:cNvPr id="4102" name="Picture 6" descr="http://media.firebox.com/pic/p2612_extra6.jpg"/>
+          <p:cNvPicPr>
+            <a:picLocks noChangeAspect="1" noChangeArrowheads="1"/>
+          </p:cNvPicPr>
+          <p:nvPr/>
+        </p:nvPicPr>
+        <p:blipFill>
+          <a:blip r:embed="rId15">
+            <a:extLst>
+              <a:ext uri="{28A0092B-C50C-407E-A947-70E740481C1C}">
+                <a14:useLocalDpi xmlns:a14="http://schemas.microsoft.com/office/drawing/2010/main" val="0"/>
+              </a:ext>
+            </a:extLst>
+          </a:blip>
+          <a:srcRect/>
+          <a:stretch>
+            <a:fillRect/>
+          </a:stretch>
+        </p:blipFill>
+        <p:spPr bwMode="auto">
+          <a:xfrm rot="5400000">
+            <a:off x="5261224" y="2664099"/>
+            <a:ext cx="1367010" cy="1205320"/>
+          </a:xfrm>
+          <a:prstGeom prst="rect">
+            <a:avLst/>
+          </a:prstGeom>
+          <a:noFill/>
+          <a:extLst>
+            <a:ext uri="{909E8E84-426E-40DD-AFC4-6F175D3DCCD1}">
+              <a14:hiddenFill xmlns:a14="http://schemas.microsoft.com/office/drawing/2010/main">
+                <a:solidFill>
+                  <a:srgbClr val="FFFFFF"/>
+                </a:solidFill>
+              </a14:hiddenFill>
+            </a:ext>
+          </a:extLst>
+        </p:spPr>
+      </p:pic>
+      <p:pic>
+        <p:nvPicPr>
+          <p:cNvPr id="42" name="Picture 6" descr="http://media.firebox.com/pic/p2612_extra6.jpg"/>
+          <p:cNvPicPr>
+            <a:picLocks noChangeAspect="1" noChangeArrowheads="1"/>
+          </p:cNvPicPr>
+          <p:nvPr/>
+        </p:nvPicPr>
+        <p:blipFill>
+          <a:blip r:embed="rId15">
+            <a:extLst>
+              <a:ext uri="{28A0092B-C50C-407E-A947-70E740481C1C}">
+                <a14:useLocalDpi xmlns:a14="http://schemas.microsoft.com/office/drawing/2010/main" val="0"/>
+              </a:ext>
+            </a:extLst>
+          </a:blip>
+          <a:srcRect/>
+          <a:stretch>
+            <a:fillRect/>
+          </a:stretch>
+        </p:blipFill>
+        <p:spPr bwMode="auto">
+          <a:xfrm rot="5400000">
+            <a:off x="3627364" y="1690357"/>
+            <a:ext cx="1376661" cy="1213830"/>
+          </a:xfrm>
+          <a:prstGeom prst="rect">
+            <a:avLst/>
+          </a:prstGeom>
+          <a:noFill/>
+          <a:extLst>
+            <a:ext uri="{909E8E84-426E-40DD-AFC4-6F175D3DCCD1}">
+              <a14:hiddenFill xmlns:a14="http://schemas.microsoft.com/office/drawing/2010/main">
+                <a:solidFill>
+                  <a:srgbClr val="FFFFFF"/>
+                </a:solidFill>
+              </a14:hiddenFill>
+            </a:ext>
+          </a:extLst>
+        </p:spPr>
+      </p:pic>
+      <p:pic>
+        <p:nvPicPr>
+          <p:cNvPr id="43" name="Picture 6" descr="http://media.firebox.com/pic/p2612_extra6.jpg"/>
+          <p:cNvPicPr>
+            <a:picLocks noChangeAspect="1" noChangeArrowheads="1"/>
+          </p:cNvPicPr>
+          <p:nvPr/>
+        </p:nvPicPr>
+        <p:blipFill>
+          <a:blip r:embed="rId15">
+            <a:extLst>
+              <a:ext uri="{28A0092B-C50C-407E-A947-70E740481C1C}">
+                <a14:useLocalDpi xmlns:a14="http://schemas.microsoft.com/office/drawing/2010/main" val="0"/>
+              </a:ext>
+            </a:extLst>
+          </a:blip>
+          <a:srcRect/>
+          <a:stretch>
+            <a:fillRect/>
+          </a:stretch>
+        </p:blipFill>
+        <p:spPr bwMode="auto">
+          <a:xfrm rot="5400000">
+            <a:off x="4721203" y="1707915"/>
+            <a:ext cx="1376661" cy="1213830"/>
+          </a:xfrm>
+          <a:prstGeom prst="rect">
+            <a:avLst/>
+          </a:prstGeom>
+          <a:noFill/>
+          <a:extLst>
+            <a:ext uri="{909E8E84-426E-40DD-AFC4-6F175D3DCCD1}">
+              <a14:hiddenFill xmlns:a14="http://schemas.microsoft.com/office/drawing/2010/main">
+                <a:solidFill>
+                  <a:srgbClr val="FFFFFF"/>
+                </a:solidFill>
+              </a14:hiddenFill>
+            </a:ext>
+          </a:extLst>
+        </p:spPr>
+      </p:pic>
+      <p:pic>
+        <p:nvPicPr>
+          <p:cNvPr id="44" name="Picture 6" descr="http://media.firebox.com/pic/p2612_extra6.jpg"/>
+          <p:cNvPicPr>
+            <a:picLocks noChangeAspect="1" noChangeArrowheads="1"/>
+          </p:cNvPicPr>
+          <p:nvPr/>
+        </p:nvPicPr>
+        <p:blipFill>
+          <a:blip r:embed="rId15">
+            <a:extLst>
+              <a:ext uri="{28A0092B-C50C-407E-A947-70E740481C1C}">
+                <a14:useLocalDpi xmlns:a14="http://schemas.microsoft.com/office/drawing/2010/main" val="0"/>
+              </a:ext>
+            </a:extLst>
+          </a:blip>
+          <a:srcRect/>
+          <a:stretch>
+            <a:fillRect/>
+          </a:stretch>
+        </p:blipFill>
+        <p:spPr bwMode="auto">
+          <a:xfrm rot="5400000">
+            <a:off x="6343869" y="2664099"/>
+            <a:ext cx="1367010" cy="1205320"/>
+          </a:xfrm>
+          <a:prstGeom prst="rect">
+            <a:avLst/>
+          </a:prstGeom>
+          <a:noFill/>
+          <a:extLst>
+            <a:ext uri="{909E8E84-426E-40DD-AFC4-6F175D3DCCD1}">
+              <a14:hiddenFill xmlns:a14="http://schemas.microsoft.com/office/drawing/2010/main">
+                <a:solidFill>
+                  <a:srgbClr val="FFFFFF"/>
+                </a:solidFill>
+              </a14:hiddenFill>
+            </a:ext>
+          </a:extLst>
+        </p:spPr>
+      </p:pic>
+      <p:pic>
+        <p:nvPicPr>
+          <p:cNvPr id="45" name="Picture 2" descr="https://tucsonhorse.files.wordpress.com/2012/10/img_2791.jpg"/>
+          <p:cNvPicPr>
+            <a:picLocks noChangeAspect="1" noChangeArrowheads="1"/>
+          </p:cNvPicPr>
+          <p:nvPr/>
+        </p:nvPicPr>
+        <p:blipFill rotWithShape="1">
+          <a:blip r:embed="rId10" cstate="print">
+            <a:extLst>
+              <a:ext uri="{28A0092B-C50C-407E-A947-70E740481C1C}">
+                <a14:useLocalDpi xmlns:a14="http://schemas.microsoft.com/office/drawing/2010/main" val="0"/>
+              </a:ext>
+            </a:extLst>
+          </a:blip>
+          <a:srcRect l="46242" t="47969" r="13134" b="4200"/>
+          <a:stretch/>
+        </p:blipFill>
+        <p:spPr bwMode="auto">
+          <a:xfrm rot="5400000">
+            <a:off x="3624937" y="3639655"/>
+            <a:ext cx="1360081" cy="1201007"/>
+          </a:xfrm>
+          <a:prstGeom prst="rect">
+            <a:avLst/>
+          </a:prstGeom>
+          <a:noFill/>
+          <a:extLst>
+            <a:ext uri="{909E8E84-426E-40DD-AFC4-6F175D3DCCD1}">
+              <a14:hiddenFill xmlns:a14="http://schemas.microsoft.com/office/drawing/2010/main">
+                <a:solidFill>
+                  <a:srgbClr val="FFFFFF"/>
+                </a:solidFill>
+              </a14:hiddenFill>
+            </a:ext>
+          </a:extLst>
+        </p:spPr>
+      </p:pic>
+      <p:pic>
+        <p:nvPicPr>
+          <p:cNvPr id="46" name="Picture 2" descr="https://tucsonhorse.files.wordpress.com/2012/10/img_2791.jpg"/>
+          <p:cNvPicPr>
+            <a:picLocks noChangeAspect="1" noChangeArrowheads="1"/>
+          </p:cNvPicPr>
+          <p:nvPr/>
+        </p:nvPicPr>
+        <p:blipFill rotWithShape="1">
+          <a:blip r:embed="rId11" cstate="print">
+            <a:extLst>
+              <a:ext uri="{28A0092B-C50C-407E-A947-70E740481C1C}">
+                <a14:useLocalDpi xmlns:a14="http://schemas.microsoft.com/office/drawing/2010/main" val="0"/>
+              </a:ext>
+            </a:extLst>
+          </a:blip>
+          <a:srcRect l="48696" r="11629" b="49103"/>
+          <a:stretch/>
+        </p:blipFill>
+        <p:spPr bwMode="auto">
+          <a:xfrm rot="5400000">
+            <a:off x="4800897" y="3615136"/>
+            <a:ext cx="1282850" cy="1234306"/>
+          </a:xfrm>
+          <a:prstGeom prst="rect">
+            <a:avLst/>
+          </a:prstGeom>
+          <a:noFill/>
+          <a:extLst>
+            <a:ext uri="{909E8E84-426E-40DD-AFC4-6F175D3DCCD1}">
+              <a14:hiddenFill xmlns:a14="http://schemas.microsoft.com/office/drawing/2010/main">
+                <a:solidFill>
+                  <a:srgbClr val="FFFFFF"/>
+                </a:solidFill>
+              </a14:hiddenFill>
+            </a:ext>
+          </a:extLst>
+        </p:spPr>
+      </p:pic>
+      <p:pic>
+        <p:nvPicPr>
+          <p:cNvPr id="48" name="Picture 2" descr="https://tucsonhorse.files.wordpress.com/2012/10/img_2791.jpg"/>
+          <p:cNvPicPr>
+            <a:picLocks noChangeAspect="1" noChangeArrowheads="1"/>
+          </p:cNvPicPr>
+          <p:nvPr/>
+        </p:nvPicPr>
+        <p:blipFill rotWithShape="1">
+          <a:blip r:embed="rId9" cstate="print">
+            <a:extLst>
+              <a:ext uri="{28A0092B-C50C-407E-A947-70E740481C1C}">
+                <a14:useLocalDpi xmlns:a14="http://schemas.microsoft.com/office/drawing/2010/main" val="0"/>
+              </a:ext>
+            </a:extLst>
+          </a:blip>
+          <a:srcRect l="9487" t="3061" r="50740" b="50375"/>
+          <a:stretch/>
+        </p:blipFill>
+        <p:spPr bwMode="auto">
+          <a:xfrm rot="5400000">
+            <a:off x="5835843" y="3643927"/>
+            <a:ext cx="1318893" cy="1158053"/>
+          </a:xfrm>
+          <a:prstGeom prst="rect">
+            <a:avLst/>
+          </a:prstGeom>
+          <a:noFill/>
+          <a:extLst>
+            <a:ext uri="{909E8E84-426E-40DD-AFC4-6F175D3DCCD1}">
+              <a14:hiddenFill xmlns:a14="http://schemas.microsoft.com/office/drawing/2010/main">
+                <a:solidFill>
+                  <a:srgbClr val="FFFFFF"/>
+                </a:solidFill>
+              </a14:hiddenFill>
+            </a:ext>
+          </a:extLst>
+        </p:spPr>
+      </p:pic>
+      <p:pic>
+        <p:nvPicPr>
+          <p:cNvPr id="49" name="Picture 2" descr="https://tucsonhorse.files.wordpress.com/2012/10/img_2791.jpg"/>
+          <p:cNvPicPr>
+            <a:picLocks noChangeAspect="1" noChangeArrowheads="1"/>
+          </p:cNvPicPr>
+          <p:nvPr/>
+        </p:nvPicPr>
+        <p:blipFill rotWithShape="1">
+          <a:blip r:embed="rId9" cstate="print">
+            <a:extLst>
+              <a:ext uri="{28A0092B-C50C-407E-A947-70E740481C1C}">
+                <a14:useLocalDpi xmlns:a14="http://schemas.microsoft.com/office/drawing/2010/main" val="0"/>
+              </a:ext>
+            </a:extLst>
+          </a:blip>
+          <a:srcRect l="9487" t="3061" r="50740" b="50375"/>
+          <a:stretch/>
+        </p:blipFill>
+        <p:spPr bwMode="auto">
+          <a:xfrm rot="5400000">
+            <a:off x="7474298" y="2695529"/>
+            <a:ext cx="1318893" cy="1158053"/>
+          </a:xfrm>
+          <a:prstGeom prst="rect">
+            <a:avLst/>
+          </a:prstGeom>
+          <a:noFill/>
+          <a:extLst>
+            <a:ext uri="{909E8E84-426E-40DD-AFC4-6F175D3DCCD1}">
+              <a14:hiddenFill xmlns:a14="http://schemas.microsoft.com/office/drawing/2010/main">
+                <a:solidFill>
+                  <a:srgbClr val="FFFFFF"/>
+                </a:solidFill>
+              </a14:hiddenFill>
+            </a:ext>
+          </a:extLst>
+        </p:spPr>
+      </p:pic>
+      <p:pic>
+        <p:nvPicPr>
+          <p:cNvPr id="50" name="Picture 2" descr="https://tucsonhorse.files.wordpress.com/2012/10/img_2791.jpg"/>
+          <p:cNvPicPr>
+            <a:picLocks noChangeAspect="1" noChangeArrowheads="1"/>
+          </p:cNvPicPr>
+          <p:nvPr/>
+        </p:nvPicPr>
+        <p:blipFill rotWithShape="1">
+          <a:blip r:embed="rId8" cstate="print">
+            <a:extLst>
+              <a:ext uri="{28A0092B-C50C-407E-A947-70E740481C1C}">
+                <a14:useLocalDpi xmlns:a14="http://schemas.microsoft.com/office/drawing/2010/main" val="0"/>
+              </a:ext>
+            </a:extLst>
+          </a:blip>
+          <a:srcRect l="9345" t="47173" r="51931" b="5313"/>
+          <a:stretch/>
+        </p:blipFill>
+        <p:spPr bwMode="auto">
+          <a:xfrm rot="5400000">
+            <a:off x="6982284" y="3685721"/>
+            <a:ext cx="1260042" cy="1159549"/>
+          </a:xfrm>
+          <a:prstGeom prst="rect">
+            <a:avLst/>
+          </a:prstGeom>
+          <a:noFill/>
+          <a:extLst>
+            <a:ext uri="{909E8E84-426E-40DD-AFC4-6F175D3DCCD1}">
+              <a14:hiddenFill xmlns:a14="http://schemas.microsoft.com/office/drawing/2010/main">
+                <a:solidFill>
+                  <a:srgbClr val="FFFFFF"/>
+                </a:solidFill>
+              </a14:hiddenFill>
+            </a:ext>
+          </a:extLst>
+        </p:spPr>
+      </p:pic>
+      <p:pic>
+        <p:nvPicPr>
+          <p:cNvPr id="51" name="Picture 2" descr="https://tucsonhorse.files.wordpress.com/2012/10/img_2791.jpg"/>
+          <p:cNvPicPr>
+            <a:picLocks noChangeAspect="1" noChangeArrowheads="1"/>
+          </p:cNvPicPr>
+          <p:nvPr/>
+        </p:nvPicPr>
+        <p:blipFill rotWithShape="1">
+          <a:blip r:embed="rId8" cstate="print">
+            <a:extLst>
+              <a:ext uri="{28A0092B-C50C-407E-A947-70E740481C1C}">
+                <a14:useLocalDpi xmlns:a14="http://schemas.microsoft.com/office/drawing/2010/main" val="0"/>
+              </a:ext>
+            </a:extLst>
+          </a:blip>
+          <a:srcRect l="9345" t="47173" r="51931" b="5313"/>
+          <a:stretch/>
+        </p:blipFill>
+        <p:spPr bwMode="auto">
+          <a:xfrm rot="5400000">
+            <a:off x="6413273" y="4652316"/>
+            <a:ext cx="1260042" cy="1159549"/>
+          </a:xfrm>
+          <a:prstGeom prst="rect">
+            <a:avLst/>
+          </a:prstGeom>
+          <a:noFill/>
+          <a:extLst>
+            <a:ext uri="{909E8E84-426E-40DD-AFC4-6F175D3DCCD1}">
+              <a14:hiddenFill xmlns:a14="http://schemas.microsoft.com/office/drawing/2010/main">
+                <a:solidFill>
+                  <a:srgbClr val="FFFFFF"/>
+                </a:solidFill>
+              </a14:hiddenFill>
+            </a:ext>
+          </a:extLst>
+        </p:spPr>
+      </p:pic>
+      <p:pic>
+        <p:nvPicPr>
+          <p:cNvPr id="52" name="Picture 2" descr="https://tucsonhorse.files.wordpress.com/2012/10/img_2791.jpg"/>
+          <p:cNvPicPr>
+            <a:picLocks noChangeAspect="1" noChangeArrowheads="1"/>
+          </p:cNvPicPr>
+          <p:nvPr/>
+        </p:nvPicPr>
+        <p:blipFill rotWithShape="1">
+          <a:blip r:embed="rId8" cstate="print">
+            <a:extLst>
+              <a:ext uri="{28A0092B-C50C-407E-A947-70E740481C1C}">
+                <a14:useLocalDpi xmlns:a14="http://schemas.microsoft.com/office/drawing/2010/main" val="0"/>
+              </a:ext>
+            </a:extLst>
+          </a:blip>
+          <a:srcRect l="9345" t="47173" r="51931" b="5313"/>
+          <a:stretch/>
+        </p:blipFill>
+        <p:spPr bwMode="auto">
+          <a:xfrm rot="5400000">
+            <a:off x="4259969" y="4636721"/>
+            <a:ext cx="1260042" cy="1159549"/>
+          </a:xfrm>
+          <a:prstGeom prst="rect">
+            <a:avLst/>
+          </a:prstGeom>
+          <a:noFill/>
+          <a:extLst>
+            <a:ext uri="{909E8E84-426E-40DD-AFC4-6F175D3DCCD1}">
+              <a14:hiddenFill xmlns:a14="http://schemas.microsoft.com/office/drawing/2010/main">
+                <a:solidFill>
+                  <a:srgbClr val="FFFFFF"/>
+                </a:solidFill>
+              </a14:hiddenFill>
+            </a:ext>
+          </a:extLst>
+        </p:spPr>
+      </p:pic>
+      <p:pic>
+        <p:nvPicPr>
+          <p:cNvPr id="53" name="Picture 2" descr="https://tucsonhorse.files.wordpress.com/2012/10/img_2791.jpg"/>
+          <p:cNvPicPr>
+            <a:picLocks noChangeAspect="1" noChangeArrowheads="1"/>
+          </p:cNvPicPr>
+          <p:nvPr/>
+        </p:nvPicPr>
+        <p:blipFill rotWithShape="1">
+          <a:blip r:embed="rId11" cstate="print">
+            <a:extLst>
+              <a:ext uri="{28A0092B-C50C-407E-A947-70E740481C1C}">
+                <a14:useLocalDpi xmlns:a14="http://schemas.microsoft.com/office/drawing/2010/main" val="0"/>
+              </a:ext>
+            </a:extLst>
+          </a:blip>
+          <a:srcRect l="48696" r="11629" b="49103"/>
+          <a:stretch/>
+        </p:blipFill>
+        <p:spPr bwMode="auto">
+          <a:xfrm rot="5400000">
+            <a:off x="5344128" y="4569644"/>
+            <a:ext cx="1282850" cy="1234306"/>
+          </a:xfrm>
+          <a:prstGeom prst="rect">
+            <a:avLst/>
+          </a:prstGeom>
+          <a:noFill/>
+          <a:extLst>
+            <a:ext uri="{909E8E84-426E-40DD-AFC4-6F175D3DCCD1}">
+              <a14:hiddenFill xmlns:a14="http://schemas.microsoft.com/office/drawing/2010/main">
+                <a:solidFill>
+                  <a:srgbClr val="FFFFFF"/>
+                </a:solidFill>
+              </a14:hiddenFill>
+            </a:ext>
+          </a:extLst>
+        </p:spPr>
+      </p:pic>
+      <p:sp>
+        <p:nvSpPr>
+          <p:cNvPr id="4" name="Oval 3"/>
+          <p:cNvSpPr/>
+          <p:nvPr/>
+        </p:nvSpPr>
+        <p:spPr>
+          <a:xfrm>
+            <a:off x="4593905" y="1138691"/>
+            <a:ext cx="553434" cy="442834"/>
+          </a:xfrm>
+          <a:prstGeom prst="ellipse">
+            <a:avLst/>
+          </a:prstGeom>
+        </p:spPr>
+        <p:style>
+          <a:lnRef idx="2">
+            <a:schemeClr val="dk1"/>
+          </a:lnRef>
+          <a:fillRef idx="1">
+            <a:schemeClr val="lt1"/>
+          </a:fillRef>
+          <a:effectRef idx="0">
+            <a:schemeClr val="dk1"/>
+          </a:effectRef>
+          <a:fontRef idx="minor">
+            <a:schemeClr val="dk1"/>
+          </a:fontRef>
+        </p:style>
+        <p:txBody>
+          <a:bodyPr rtlCol="0" anchor="ctr"/>
+          <a:lstStyle/>
+          <a:p>
+            <a:pPr algn="ctr"/>
+            <a:r>
+              <a:rPr lang="en-US" sz="1400" dirty="0"/>
+              <a:t>3</a:t>
+            </a:r>
+          </a:p>
+        </p:txBody>
+      </p:sp>
+      <p:sp>
+        <p:nvSpPr>
+          <p:cNvPr id="54" name="Oval 53"/>
+          <p:cNvSpPr/>
+          <p:nvPr/>
+        </p:nvSpPr>
+        <p:spPr>
+          <a:xfrm>
+            <a:off x="5659989" y="1137352"/>
+            <a:ext cx="553434" cy="442834"/>
+          </a:xfrm>
+          <a:prstGeom prst="ellipse">
+            <a:avLst/>
+          </a:prstGeom>
+        </p:spPr>
+        <p:style>
+          <a:lnRef idx="2">
+            <a:schemeClr val="dk1"/>
+          </a:lnRef>
+          <a:fillRef idx="1">
+            <a:schemeClr val="lt1"/>
+          </a:fillRef>
+          <a:effectRef idx="0">
+            <a:schemeClr val="dk1"/>
+          </a:effectRef>
+          <a:fontRef idx="minor">
+            <a:schemeClr val="dk1"/>
+          </a:fontRef>
+        </p:style>
+        <p:txBody>
+          <a:bodyPr rtlCol="0" anchor="ctr"/>
+          <a:lstStyle/>
+          <a:p>
+            <a:pPr algn="ctr"/>
+            <a:r>
+              <a:rPr lang="en-US" sz="1400" dirty="0" smtClean="0"/>
+              <a:t>10</a:t>
+            </a:r>
+            <a:endParaRPr lang="en-US" sz="1400" dirty="0"/>
+          </a:p>
+        </p:txBody>
+      </p:sp>
+      <p:sp>
+        <p:nvSpPr>
+          <p:cNvPr id="55" name="Oval 54"/>
+          <p:cNvSpPr/>
+          <p:nvPr/>
+        </p:nvSpPr>
+        <p:spPr>
+          <a:xfrm>
+            <a:off x="6785821" y="1141055"/>
+            <a:ext cx="553434" cy="442834"/>
+          </a:xfrm>
+          <a:prstGeom prst="ellipse">
+            <a:avLst/>
+          </a:prstGeom>
+        </p:spPr>
+        <p:style>
+          <a:lnRef idx="2">
+            <a:schemeClr val="dk1"/>
+          </a:lnRef>
+          <a:fillRef idx="1">
+            <a:schemeClr val="lt1"/>
+          </a:fillRef>
+          <a:effectRef idx="0">
+            <a:schemeClr val="dk1"/>
+          </a:effectRef>
+          <a:fontRef idx="minor">
+            <a:schemeClr val="dk1"/>
+          </a:fontRef>
+        </p:style>
+        <p:txBody>
+          <a:bodyPr rtlCol="0" anchor="ctr"/>
+          <a:lstStyle/>
+          <a:p>
+            <a:pPr algn="ctr"/>
+            <a:r>
+              <a:rPr lang="en-US" sz="1400" dirty="0"/>
+              <a:t>4</a:t>
+            </a:r>
+          </a:p>
+        </p:txBody>
+      </p:sp>
+      <p:sp>
+        <p:nvSpPr>
+          <p:cNvPr id="56" name="Oval 55"/>
+          <p:cNvSpPr/>
+          <p:nvPr/>
+        </p:nvSpPr>
+        <p:spPr>
+          <a:xfrm>
+            <a:off x="4027870" y="2075766"/>
+            <a:ext cx="553434" cy="442834"/>
+          </a:xfrm>
+          <a:prstGeom prst="ellipse">
+            <a:avLst/>
+          </a:prstGeom>
+        </p:spPr>
+        <p:style>
+          <a:lnRef idx="2">
+            <a:schemeClr val="dk1"/>
+          </a:lnRef>
+          <a:fillRef idx="1">
+            <a:schemeClr val="lt1"/>
+          </a:fillRef>
+          <a:effectRef idx="0">
+            <a:schemeClr val="dk1"/>
+          </a:effectRef>
+          <a:fontRef idx="minor">
+            <a:schemeClr val="dk1"/>
+          </a:fontRef>
+        </p:style>
+        <p:txBody>
+          <a:bodyPr rtlCol="0" anchor="ctr"/>
+          <a:lstStyle/>
+          <a:p>
+            <a:pPr algn="ctr"/>
+            <a:r>
+              <a:rPr lang="en-US" sz="1400" dirty="0" smtClean="0"/>
+              <a:t>11</a:t>
+            </a:r>
+            <a:endParaRPr lang="en-US" sz="1400" dirty="0"/>
+          </a:p>
+        </p:txBody>
+      </p:sp>
+      <p:sp>
+        <p:nvSpPr>
+          <p:cNvPr id="57" name="Oval 56"/>
+          <p:cNvSpPr/>
+          <p:nvPr/>
+        </p:nvSpPr>
+        <p:spPr>
+          <a:xfrm>
+            <a:off x="5093954" y="2074427"/>
+            <a:ext cx="553434" cy="442834"/>
+          </a:xfrm>
+          <a:prstGeom prst="ellipse">
+            <a:avLst/>
+          </a:prstGeom>
+        </p:spPr>
+        <p:style>
+          <a:lnRef idx="2">
+            <a:schemeClr val="dk1"/>
+          </a:lnRef>
+          <a:fillRef idx="1">
+            <a:schemeClr val="lt1"/>
+          </a:fillRef>
+          <a:effectRef idx="0">
+            <a:schemeClr val="dk1"/>
+          </a:effectRef>
+          <a:fontRef idx="minor">
+            <a:schemeClr val="dk1"/>
+          </a:fontRef>
+        </p:style>
+        <p:txBody>
+          <a:bodyPr rtlCol="0" anchor="ctr"/>
+          <a:lstStyle/>
+          <a:p>
+            <a:pPr algn="ctr"/>
+            <a:r>
+              <a:rPr lang="en-US" sz="1400" dirty="0"/>
+              <a:t>9</a:t>
+            </a:r>
+          </a:p>
+        </p:txBody>
+      </p:sp>
+      <p:sp>
+        <p:nvSpPr>
+          <p:cNvPr id="62" name="Oval 61"/>
+          <p:cNvSpPr/>
+          <p:nvPr/>
+        </p:nvSpPr>
+        <p:spPr>
+          <a:xfrm>
+            <a:off x="3476238" y="3031961"/>
+            <a:ext cx="553434" cy="442834"/>
+          </a:xfrm>
+          <a:prstGeom prst="ellipse">
+            <a:avLst/>
+          </a:prstGeom>
+        </p:spPr>
+        <p:style>
+          <a:lnRef idx="2">
+            <a:schemeClr val="dk1"/>
+          </a:lnRef>
+          <a:fillRef idx="1">
+            <a:schemeClr val="lt1"/>
+          </a:fillRef>
+          <a:effectRef idx="0">
+            <a:schemeClr val="dk1"/>
+          </a:effectRef>
+          <a:fontRef idx="minor">
+            <a:schemeClr val="dk1"/>
+          </a:fontRef>
+        </p:style>
+        <p:txBody>
+          <a:bodyPr rtlCol="0" anchor="ctr"/>
+          <a:lstStyle/>
+          <a:p>
+            <a:pPr algn="ctr"/>
+            <a:r>
+              <a:rPr lang="en-US" sz="1400" dirty="0"/>
+              <a:t>8</a:t>
+            </a:r>
+          </a:p>
+        </p:txBody>
+      </p:sp>
+      <p:sp>
+        <p:nvSpPr>
+          <p:cNvPr id="63" name="Oval 62"/>
+          <p:cNvSpPr/>
+          <p:nvPr/>
+        </p:nvSpPr>
+        <p:spPr>
+          <a:xfrm>
+            <a:off x="4542322" y="3030622"/>
+            <a:ext cx="553434" cy="442834"/>
+          </a:xfrm>
+          <a:prstGeom prst="ellipse">
+            <a:avLst/>
+          </a:prstGeom>
+        </p:spPr>
+        <p:style>
+          <a:lnRef idx="2">
+            <a:schemeClr val="dk1"/>
+          </a:lnRef>
+          <a:fillRef idx="1">
+            <a:schemeClr val="lt1"/>
+          </a:fillRef>
+          <a:effectRef idx="0">
+            <a:schemeClr val="dk1"/>
+          </a:effectRef>
+          <a:fontRef idx="minor">
+            <a:schemeClr val="dk1"/>
+          </a:fontRef>
+        </p:style>
+        <p:txBody>
+          <a:bodyPr rtlCol="0" anchor="ctr"/>
+          <a:lstStyle/>
+          <a:p>
+            <a:pPr algn="ctr"/>
+            <a:r>
+              <a:rPr lang="en-US" sz="1400" dirty="0"/>
+              <a:t>4</a:t>
+            </a:r>
+          </a:p>
+        </p:txBody>
+      </p:sp>
+      <p:sp>
+        <p:nvSpPr>
+          <p:cNvPr id="64" name="Oval 63"/>
+          <p:cNvSpPr/>
+          <p:nvPr/>
+        </p:nvSpPr>
+        <p:spPr>
+          <a:xfrm>
+            <a:off x="5668154" y="3034325"/>
+            <a:ext cx="553434" cy="442834"/>
+          </a:xfrm>
+          <a:prstGeom prst="ellipse">
+            <a:avLst/>
+          </a:prstGeom>
+        </p:spPr>
+        <p:style>
+          <a:lnRef idx="2">
+            <a:schemeClr val="dk1"/>
+          </a:lnRef>
+          <a:fillRef idx="1">
+            <a:schemeClr val="lt1"/>
+          </a:fillRef>
+          <a:effectRef idx="0">
+            <a:schemeClr val="dk1"/>
+          </a:effectRef>
+          <a:fontRef idx="minor">
+            <a:schemeClr val="dk1"/>
+          </a:fontRef>
+        </p:style>
+        <p:txBody>
+          <a:bodyPr rtlCol="0" anchor="ctr"/>
+          <a:lstStyle/>
+          <a:p>
+            <a:pPr algn="ctr"/>
+            <a:r>
+              <a:rPr lang="en-US" sz="1400" dirty="0" smtClean="0"/>
+              <a:t>10</a:t>
+            </a:r>
+            <a:endParaRPr lang="en-US" sz="1400" dirty="0"/>
+          </a:p>
+        </p:txBody>
+      </p:sp>
+      <p:sp>
+        <p:nvSpPr>
+          <p:cNvPr id="68" name="Oval 67"/>
+          <p:cNvSpPr/>
+          <p:nvPr/>
+        </p:nvSpPr>
+        <p:spPr>
+          <a:xfrm>
+            <a:off x="3995858" y="4002612"/>
+            <a:ext cx="553434" cy="442834"/>
+          </a:xfrm>
+          <a:prstGeom prst="ellipse">
+            <a:avLst/>
+          </a:prstGeom>
+        </p:spPr>
+        <p:style>
+          <a:lnRef idx="2">
+            <a:schemeClr val="dk1"/>
+          </a:lnRef>
+          <a:fillRef idx="1">
+            <a:schemeClr val="lt1"/>
+          </a:fillRef>
+          <a:effectRef idx="0">
+            <a:schemeClr val="dk1"/>
+          </a:effectRef>
+          <a:fontRef idx="minor">
+            <a:schemeClr val="dk1"/>
+          </a:fontRef>
+        </p:style>
+        <p:txBody>
+          <a:bodyPr rtlCol="0" anchor="ctr"/>
+          <a:lstStyle/>
+          <a:p>
+            <a:pPr algn="ctr"/>
+            <a:r>
+              <a:rPr lang="en-US" sz="1400" dirty="0"/>
+              <a:t>6</a:t>
+            </a:r>
+          </a:p>
+        </p:txBody>
+      </p:sp>
+      <p:sp>
+        <p:nvSpPr>
+          <p:cNvPr id="69" name="Oval 68"/>
+          <p:cNvSpPr/>
+          <p:nvPr/>
+        </p:nvSpPr>
+        <p:spPr>
+          <a:xfrm>
+            <a:off x="5061942" y="4001273"/>
+            <a:ext cx="553434" cy="442834"/>
+          </a:xfrm>
+          <a:prstGeom prst="ellipse">
+            <a:avLst/>
+          </a:prstGeom>
+        </p:spPr>
+        <p:style>
+          <a:lnRef idx="2">
+            <a:schemeClr val="dk1"/>
+          </a:lnRef>
+          <a:fillRef idx="1">
+            <a:schemeClr val="lt1"/>
+          </a:fillRef>
+          <a:effectRef idx="0">
+            <a:schemeClr val="dk1"/>
+          </a:effectRef>
+          <a:fontRef idx="minor">
+            <a:schemeClr val="dk1"/>
+          </a:fontRef>
+        </p:style>
+        <p:txBody>
+          <a:bodyPr rtlCol="0" anchor="ctr"/>
+          <a:lstStyle/>
+          <a:p>
+            <a:pPr algn="ctr"/>
+            <a:r>
+              <a:rPr lang="en-US" sz="1400" dirty="0"/>
+              <a:t>5</a:t>
+            </a:r>
+          </a:p>
+        </p:txBody>
+      </p:sp>
+      <p:sp>
+        <p:nvSpPr>
+          <p:cNvPr id="70" name="Oval 69"/>
+          <p:cNvSpPr/>
+          <p:nvPr/>
+        </p:nvSpPr>
+        <p:spPr>
+          <a:xfrm>
+            <a:off x="6187774" y="4004976"/>
+            <a:ext cx="553434" cy="442834"/>
+          </a:xfrm>
+          <a:prstGeom prst="ellipse">
+            <a:avLst/>
+          </a:prstGeom>
+        </p:spPr>
+        <p:style>
+          <a:lnRef idx="2">
+            <a:schemeClr val="dk1"/>
+          </a:lnRef>
+          <a:fillRef idx="1">
+            <a:schemeClr val="lt1"/>
+          </a:fillRef>
+          <a:effectRef idx="0">
+            <a:schemeClr val="dk1"/>
+          </a:effectRef>
+          <a:fontRef idx="minor">
+            <a:schemeClr val="dk1"/>
+          </a:fontRef>
+        </p:style>
+        <p:txBody>
+          <a:bodyPr rtlCol="0" anchor="ctr"/>
+          <a:lstStyle/>
+          <a:p>
+            <a:pPr algn="ctr"/>
+            <a:r>
+              <a:rPr lang="en-US" sz="1400" dirty="0" smtClean="0"/>
+              <a:t>12</a:t>
+            </a:r>
+            <a:endParaRPr lang="en-US" sz="1400" dirty="0"/>
+          </a:p>
+        </p:txBody>
+      </p:sp>
+      <p:sp>
+        <p:nvSpPr>
+          <p:cNvPr id="71" name="Oval 70"/>
+          <p:cNvSpPr/>
+          <p:nvPr/>
+        </p:nvSpPr>
+        <p:spPr>
+          <a:xfrm>
+            <a:off x="4623136" y="4980815"/>
+            <a:ext cx="553434" cy="442834"/>
+          </a:xfrm>
+          <a:prstGeom prst="ellipse">
+            <a:avLst/>
+          </a:prstGeom>
+        </p:spPr>
+        <p:style>
+          <a:lnRef idx="2">
+            <a:schemeClr val="dk1"/>
+          </a:lnRef>
+          <a:fillRef idx="1">
+            <a:schemeClr val="lt1"/>
+          </a:fillRef>
+          <a:effectRef idx="0">
+            <a:schemeClr val="dk1"/>
+          </a:effectRef>
+          <a:fontRef idx="minor">
+            <a:schemeClr val="dk1"/>
+          </a:fontRef>
+        </p:style>
+        <p:txBody>
+          <a:bodyPr rtlCol="0" anchor="ctr"/>
+          <a:lstStyle/>
+          <a:p>
+            <a:pPr algn="ctr"/>
+            <a:r>
+              <a:rPr lang="en-US" sz="1400" dirty="0" smtClean="0"/>
+              <a:t>2</a:t>
+            </a:r>
+            <a:endParaRPr lang="en-US" sz="1400" dirty="0"/>
+          </a:p>
+        </p:txBody>
+      </p:sp>
+      <p:sp>
+        <p:nvSpPr>
+          <p:cNvPr id="72" name="Oval 71"/>
+          <p:cNvSpPr/>
+          <p:nvPr/>
+        </p:nvSpPr>
+        <p:spPr>
+          <a:xfrm>
+            <a:off x="5689220" y="4979476"/>
+            <a:ext cx="553434" cy="442834"/>
+          </a:xfrm>
+          <a:prstGeom prst="ellipse">
+            <a:avLst/>
+          </a:prstGeom>
+        </p:spPr>
+        <p:style>
+          <a:lnRef idx="2">
+            <a:schemeClr val="dk1"/>
+          </a:lnRef>
+          <a:fillRef idx="1">
+            <a:schemeClr val="lt1"/>
+          </a:fillRef>
+          <a:effectRef idx="0">
+            <a:schemeClr val="dk1"/>
+          </a:effectRef>
+          <a:fontRef idx="minor">
+            <a:schemeClr val="dk1"/>
+          </a:fontRef>
+        </p:style>
+        <p:txBody>
+          <a:bodyPr rtlCol="0" anchor="ctr"/>
+          <a:lstStyle/>
+          <a:p>
+            <a:pPr algn="ctr"/>
+            <a:r>
+              <a:rPr lang="en-US" sz="1400" dirty="0"/>
+              <a:t>9</a:t>
+            </a:r>
+          </a:p>
+        </p:txBody>
+      </p:sp>
+      <p:sp>
+        <p:nvSpPr>
+          <p:cNvPr id="73" name="Oval 72"/>
+          <p:cNvSpPr/>
+          <p:nvPr/>
+        </p:nvSpPr>
+        <p:spPr>
+          <a:xfrm>
+            <a:off x="6815052" y="4983179"/>
+            <a:ext cx="553434" cy="442834"/>
+          </a:xfrm>
+          <a:prstGeom prst="ellipse">
+            <a:avLst/>
+          </a:prstGeom>
+        </p:spPr>
+        <p:style>
+          <a:lnRef idx="2">
+            <a:schemeClr val="dk1"/>
+          </a:lnRef>
+          <a:fillRef idx="1">
+            <a:schemeClr val="lt1"/>
+          </a:fillRef>
+          <a:effectRef idx="0">
+            <a:schemeClr val="dk1"/>
+          </a:effectRef>
+          <a:fontRef idx="minor">
+            <a:schemeClr val="dk1"/>
+          </a:fontRef>
+        </p:style>
+        <p:txBody>
+          <a:bodyPr rtlCol="0" anchor="ctr"/>
+          <a:lstStyle/>
+          <a:p>
+            <a:pPr algn="ctr"/>
+            <a:r>
+              <a:rPr lang="en-US" sz="1400" dirty="0" smtClean="0"/>
+              <a:t>5</a:t>
+            </a:r>
+            <a:endParaRPr lang="en-US" sz="1400" dirty="0"/>
+          </a:p>
+        </p:txBody>
+      </p:sp>
+      <p:sp>
+        <p:nvSpPr>
+          <p:cNvPr id="74" name="Oval 73"/>
+          <p:cNvSpPr/>
+          <p:nvPr/>
+        </p:nvSpPr>
+        <p:spPr>
+          <a:xfrm>
+            <a:off x="6723687" y="3030622"/>
+            <a:ext cx="553434" cy="442834"/>
+          </a:xfrm>
+          <a:prstGeom prst="ellipse">
+            <a:avLst/>
+          </a:prstGeom>
+        </p:spPr>
+        <p:style>
+          <a:lnRef idx="2">
+            <a:schemeClr val="dk1"/>
+          </a:lnRef>
+          <a:fillRef idx="1">
+            <a:schemeClr val="lt1"/>
+          </a:fillRef>
+          <a:effectRef idx="0">
+            <a:schemeClr val="dk1"/>
+          </a:effectRef>
+          <a:fontRef idx="minor">
+            <a:schemeClr val="dk1"/>
+          </a:fontRef>
+        </p:style>
+        <p:txBody>
+          <a:bodyPr rtlCol="0" anchor="ctr"/>
+          <a:lstStyle/>
+          <a:p>
+            <a:pPr algn="ctr"/>
+            <a:r>
+              <a:rPr lang="en-US" sz="1400" dirty="0"/>
+              <a:t>6</a:t>
+            </a:r>
+          </a:p>
+        </p:txBody>
+      </p:sp>
+      <p:sp>
+        <p:nvSpPr>
+          <p:cNvPr id="75" name="Oval 74"/>
+          <p:cNvSpPr/>
+          <p:nvPr/>
+        </p:nvSpPr>
+        <p:spPr>
+          <a:xfrm>
+            <a:off x="7789771" y="3029283"/>
+            <a:ext cx="553434" cy="442834"/>
+          </a:xfrm>
+          <a:prstGeom prst="ellipse">
+            <a:avLst/>
+          </a:prstGeom>
+        </p:spPr>
+        <p:style>
+          <a:lnRef idx="2">
+            <a:schemeClr val="dk1"/>
+          </a:lnRef>
+          <a:fillRef idx="1">
+            <a:schemeClr val="lt1"/>
+          </a:fillRef>
+          <a:effectRef idx="0">
+            <a:schemeClr val="dk1"/>
+          </a:effectRef>
+          <a:fontRef idx="minor">
+            <a:schemeClr val="dk1"/>
+          </a:fontRef>
+        </p:style>
+        <p:txBody>
+          <a:bodyPr rtlCol="0" anchor="ctr"/>
+          <a:lstStyle/>
+          <a:p>
+            <a:pPr algn="ctr"/>
+            <a:r>
+              <a:rPr lang="en-US" sz="1400" dirty="0" smtClean="0"/>
+              <a:t>8</a:t>
+            </a:r>
+            <a:endParaRPr lang="en-US" sz="1400" dirty="0"/>
+          </a:p>
+        </p:txBody>
+      </p:sp>
+      <p:sp>
+        <p:nvSpPr>
+          <p:cNvPr id="76" name="Oval 75"/>
+          <p:cNvSpPr/>
+          <p:nvPr/>
+        </p:nvSpPr>
+        <p:spPr>
+          <a:xfrm>
+            <a:off x="7308168" y="4008140"/>
+            <a:ext cx="553434" cy="442834"/>
+          </a:xfrm>
+          <a:prstGeom prst="ellipse">
+            <a:avLst/>
+          </a:prstGeom>
+        </p:spPr>
+        <p:style>
+          <a:lnRef idx="2">
+            <a:schemeClr val="dk1"/>
+          </a:lnRef>
+          <a:fillRef idx="1">
+            <a:schemeClr val="lt1"/>
+          </a:fillRef>
+          <a:effectRef idx="0">
+            <a:schemeClr val="dk1"/>
+          </a:effectRef>
+          <a:fontRef idx="minor">
+            <a:schemeClr val="dk1"/>
+          </a:fontRef>
+        </p:style>
+        <p:txBody>
+          <a:bodyPr rtlCol="0" anchor="ctr"/>
+          <a:lstStyle/>
+          <a:p>
+            <a:pPr algn="ctr"/>
+            <a:r>
+              <a:rPr lang="en-US" sz="1400" dirty="0" smtClean="0"/>
+              <a:t>11</a:t>
+            </a:r>
+            <a:endParaRPr lang="en-US" sz="1400" dirty="0"/>
+          </a:p>
+        </p:txBody>
+      </p:sp>
+      <p:sp>
+        <p:nvSpPr>
+          <p:cNvPr id="77" name="Oval 76"/>
+          <p:cNvSpPr/>
+          <p:nvPr/>
+        </p:nvSpPr>
+        <p:spPr>
+          <a:xfrm>
+            <a:off x="7303940" y="2078130"/>
+            <a:ext cx="553434" cy="442834"/>
+          </a:xfrm>
+          <a:prstGeom prst="ellipse">
+            <a:avLst/>
+          </a:prstGeom>
+        </p:spPr>
+        <p:style>
+          <a:lnRef idx="2">
+            <a:schemeClr val="dk1"/>
+          </a:lnRef>
+          <a:fillRef idx="1">
+            <a:schemeClr val="lt1"/>
+          </a:fillRef>
+          <a:effectRef idx="0">
+            <a:schemeClr val="dk1"/>
+          </a:effectRef>
+          <a:fontRef idx="minor">
+            <a:schemeClr val="dk1"/>
+          </a:fontRef>
+        </p:style>
+        <p:txBody>
+          <a:bodyPr rtlCol="0" anchor="ctr"/>
+          <a:lstStyle/>
+          <a:p>
+            <a:pPr algn="ctr"/>
+            <a:r>
+              <a:rPr lang="en-US" sz="1400" dirty="0"/>
+              <a:t>3</a:t>
+            </a:r>
+          </a:p>
+        </p:txBody>
+      </p:sp>
+      <p:sp>
+        <p:nvSpPr>
+          <p:cNvPr id="7" name="Can 6"/>
+          <p:cNvSpPr/>
+          <p:nvPr/>
+        </p:nvSpPr>
+        <p:spPr>
+          <a:xfrm>
+            <a:off x="6303421" y="2014245"/>
+            <a:ext cx="391735" cy="478676"/>
+          </a:xfrm>
+          <a:prstGeom prst="can">
+            <a:avLst/>
+          </a:prstGeom>
+        </p:spPr>
+        <p:style>
+          <a:lnRef idx="2">
+            <a:schemeClr val="dk1">
+              <a:shade val="50000"/>
+            </a:schemeClr>
+          </a:lnRef>
+          <a:fillRef idx="1">
+            <a:schemeClr val="dk1"/>
+          </a:fillRef>
+          <a:effectRef idx="0">
+            <a:schemeClr val="dk1"/>
+          </a:effectRef>
+          <a:fontRef idx="minor">
+            <a:schemeClr val="lt1"/>
+          </a:fontRef>
+        </p:style>
+        <p:txBody>
+          <a:bodyPr rtlCol="0" anchor="ctr"/>
+          <a:lstStyle/>
+          <a:p>
+            <a:pPr algn="ctr"/>
+            <a:endParaRPr lang="en-US"/>
+          </a:p>
+        </p:txBody>
+      </p:sp>
+      <p:sp>
+        <p:nvSpPr>
+          <p:cNvPr id="79" name="Cube 78"/>
+          <p:cNvSpPr/>
+          <p:nvPr/>
+        </p:nvSpPr>
+        <p:spPr>
+          <a:xfrm>
+            <a:off x="4611723" y="3778307"/>
+            <a:ext cx="373151" cy="238397"/>
+          </a:xfrm>
+          <a:prstGeom prst="cube">
+            <a:avLst/>
+          </a:prstGeom>
+        </p:spPr>
+        <p:style>
+          <a:lnRef idx="2">
+            <a:schemeClr val="accent2">
+              <a:shade val="50000"/>
+            </a:schemeClr>
+          </a:lnRef>
+          <a:fillRef idx="1">
+            <a:schemeClr val="accent2"/>
+          </a:fillRef>
+          <a:effectRef idx="0">
+            <a:schemeClr val="accent2"/>
+          </a:effectRef>
+          <a:fontRef idx="minor">
+            <a:schemeClr val="lt1"/>
+          </a:fontRef>
+        </p:style>
+        <p:txBody>
+          <a:bodyPr rtlCol="0" anchor="ctr"/>
+          <a:lstStyle/>
+          <a:p>
+            <a:pPr algn="ctr"/>
+            <a:endParaRPr lang="en-US"/>
+          </a:p>
+        </p:txBody>
+      </p:sp>
+      <p:sp>
+        <p:nvSpPr>
+          <p:cNvPr id="80" name="Rectangle 79"/>
+          <p:cNvSpPr/>
+          <p:nvPr/>
+        </p:nvSpPr>
+        <p:spPr>
+          <a:xfrm rot="19988843">
+            <a:off x="5010279" y="3661786"/>
+            <a:ext cx="386064" cy="94537"/>
+          </a:xfrm>
+          <a:prstGeom prst="rect">
+            <a:avLst/>
+          </a:prstGeom>
+        </p:spPr>
+        <p:style>
+          <a:lnRef idx="2">
+            <a:schemeClr val="accent2">
+              <a:shade val="50000"/>
+            </a:schemeClr>
+          </a:lnRef>
+          <a:fillRef idx="1">
+            <a:schemeClr val="accent2"/>
+          </a:fillRef>
+          <a:effectRef idx="0">
+            <a:schemeClr val="accent2"/>
+          </a:effectRef>
+          <a:fontRef idx="minor">
+            <a:schemeClr val="lt1"/>
+          </a:fontRef>
+        </p:style>
+        <p:txBody>
+          <a:bodyPr rtlCol="0" anchor="ctr"/>
+          <a:lstStyle/>
+          <a:p>
+            <a:pPr algn="ctr"/>
+            <a:endParaRPr lang="en-US"/>
+          </a:p>
+        </p:txBody>
+      </p:sp>
+      <p:sp>
+        <p:nvSpPr>
+          <p:cNvPr id="81" name="Cube 80"/>
+          <p:cNvSpPr/>
+          <p:nvPr/>
+        </p:nvSpPr>
+        <p:spPr>
+          <a:xfrm>
+            <a:off x="7421629" y="3471426"/>
+            <a:ext cx="373151" cy="238397"/>
+          </a:xfrm>
+          <a:prstGeom prst="cube">
+            <a:avLst/>
+          </a:prstGeom>
+        </p:spPr>
+        <p:style>
+          <a:lnRef idx="2">
+            <a:schemeClr val="accent2">
+              <a:shade val="50000"/>
+            </a:schemeClr>
+          </a:lnRef>
+          <a:fillRef idx="1">
+            <a:schemeClr val="accent2"/>
+          </a:fillRef>
+          <a:effectRef idx="0">
+            <a:schemeClr val="accent2"/>
+          </a:effectRef>
+          <a:fontRef idx="minor">
+            <a:schemeClr val="lt1"/>
+          </a:fontRef>
+        </p:style>
+        <p:txBody>
+          <a:bodyPr rtlCol="0" anchor="ctr"/>
+          <a:lstStyle/>
+          <a:p>
+            <a:pPr algn="ctr"/>
+            <a:endParaRPr lang="en-US"/>
+          </a:p>
+        </p:txBody>
+      </p:sp>
+      <p:sp>
+        <p:nvSpPr>
+          <p:cNvPr id="82" name="Rectangle 81"/>
+          <p:cNvSpPr/>
+          <p:nvPr/>
+        </p:nvSpPr>
+        <p:spPr>
+          <a:xfrm rot="19988843">
+            <a:off x="7058387" y="3744291"/>
+            <a:ext cx="386064" cy="94537"/>
+          </a:xfrm>
+          <a:prstGeom prst="rect">
+            <a:avLst/>
+          </a:prstGeom>
+        </p:spPr>
+        <p:style>
+          <a:lnRef idx="2">
+            <a:schemeClr val="accent2">
+              <a:shade val="50000"/>
+            </a:schemeClr>
+          </a:lnRef>
+          <a:fillRef idx="1">
+            <a:schemeClr val="accent2"/>
+          </a:fillRef>
+          <a:effectRef idx="0">
+            <a:schemeClr val="accent2"/>
+          </a:effectRef>
+          <a:fontRef idx="minor">
+            <a:schemeClr val="lt1"/>
+          </a:fontRef>
+        </p:style>
+        <p:txBody>
+          <a:bodyPr rtlCol="0" anchor="ctr"/>
+          <a:lstStyle/>
+          <a:p>
+            <a:pPr algn="ctr"/>
+            <a:endParaRPr lang="en-US"/>
+          </a:p>
+        </p:txBody>
+      </p:sp>
+      <p:sp>
+        <p:nvSpPr>
+          <p:cNvPr id="83" name="Cube 82"/>
+          <p:cNvSpPr/>
+          <p:nvPr/>
+        </p:nvSpPr>
+        <p:spPr>
+          <a:xfrm>
+            <a:off x="5220748" y="2752538"/>
+            <a:ext cx="373151" cy="238397"/>
+          </a:xfrm>
+          <a:prstGeom prst="cube">
+            <a:avLst/>
+          </a:prstGeom>
+        </p:spPr>
+        <p:style>
+          <a:lnRef idx="2">
+            <a:schemeClr val="accent4">
+              <a:shade val="50000"/>
+            </a:schemeClr>
+          </a:lnRef>
+          <a:fillRef idx="1">
+            <a:schemeClr val="accent4"/>
+          </a:fillRef>
+          <a:effectRef idx="0">
+            <a:schemeClr val="accent4"/>
+          </a:effectRef>
+          <a:fontRef idx="minor">
+            <a:schemeClr val="lt1"/>
+          </a:fontRef>
+        </p:style>
+        <p:txBody>
+          <a:bodyPr rtlCol="0" anchor="ctr"/>
+          <a:lstStyle/>
+          <a:p>
+            <a:pPr algn="ctr"/>
+            <a:endParaRPr lang="en-US"/>
+          </a:p>
+        </p:txBody>
+      </p:sp>
+      <p:sp>
+        <p:nvSpPr>
+          <p:cNvPr id="84" name="Rectangle 83"/>
+          <p:cNvSpPr/>
+          <p:nvPr/>
+        </p:nvSpPr>
+        <p:spPr>
+          <a:xfrm rot="19988843">
+            <a:off x="5536570" y="2723140"/>
+            <a:ext cx="386064" cy="94537"/>
+          </a:xfrm>
+          <a:prstGeom prst="rect">
+            <a:avLst/>
+          </a:prstGeom>
+        </p:spPr>
+        <p:style>
+          <a:lnRef idx="2">
+            <a:schemeClr val="accent4">
+              <a:shade val="50000"/>
+            </a:schemeClr>
+          </a:lnRef>
+          <a:fillRef idx="1">
+            <a:schemeClr val="accent4"/>
+          </a:fillRef>
+          <a:effectRef idx="0">
+            <a:schemeClr val="accent4"/>
+          </a:effectRef>
+          <a:fontRef idx="minor">
+            <a:schemeClr val="lt1"/>
+          </a:fontRef>
+        </p:style>
+        <p:txBody>
+          <a:bodyPr rtlCol="0" anchor="ctr"/>
+          <a:lstStyle/>
+          <a:p>
+            <a:pPr algn="ctr"/>
+            <a:endParaRPr lang="en-US"/>
+          </a:p>
+        </p:txBody>
+      </p:sp>
+      <p:sp>
+        <p:nvSpPr>
+          <p:cNvPr id="85" name="Cube 84"/>
+          <p:cNvSpPr/>
+          <p:nvPr/>
+        </p:nvSpPr>
+        <p:spPr>
+          <a:xfrm>
+            <a:off x="6312972" y="3466525"/>
+            <a:ext cx="373151" cy="238397"/>
+          </a:xfrm>
+          <a:prstGeom prst="cube">
+            <a:avLst/>
+          </a:prstGeom>
+        </p:spPr>
+        <p:style>
+          <a:lnRef idx="2">
+            <a:schemeClr val="accent6">
+              <a:shade val="50000"/>
+            </a:schemeClr>
+          </a:lnRef>
+          <a:fillRef idx="1">
+            <a:schemeClr val="accent6"/>
+          </a:fillRef>
+          <a:effectRef idx="0">
+            <a:schemeClr val="accent6"/>
+          </a:effectRef>
+          <a:fontRef idx="minor">
+            <a:schemeClr val="lt1"/>
+          </a:fontRef>
+        </p:style>
+        <p:txBody>
+          <a:bodyPr rtlCol="0" anchor="ctr"/>
+          <a:lstStyle/>
+          <a:p>
+            <a:pPr algn="ctr"/>
+            <a:endParaRPr lang="en-US"/>
+          </a:p>
+        </p:txBody>
+      </p:sp>
+      <p:sp>
+        <p:nvSpPr>
+          <p:cNvPr id="86" name="Cube 85"/>
+          <p:cNvSpPr/>
+          <p:nvPr/>
+        </p:nvSpPr>
+        <p:spPr>
+          <a:xfrm>
+            <a:off x="6860050" y="4467275"/>
+            <a:ext cx="373151" cy="238397"/>
+          </a:xfrm>
+          <a:prstGeom prst="cube">
+            <a:avLst/>
+          </a:prstGeom>
+        </p:spPr>
+        <p:style>
+          <a:lnRef idx="2">
+            <a:schemeClr val="accent6">
+              <a:shade val="50000"/>
+            </a:schemeClr>
+          </a:lnRef>
+          <a:fillRef idx="1">
+            <a:schemeClr val="accent6"/>
+          </a:fillRef>
+          <a:effectRef idx="0">
+            <a:schemeClr val="accent6"/>
+          </a:effectRef>
+          <a:fontRef idx="minor">
+            <a:schemeClr val="lt1"/>
+          </a:fontRef>
+        </p:style>
+        <p:txBody>
+          <a:bodyPr rtlCol="0" anchor="ctr"/>
+          <a:lstStyle/>
+          <a:p>
+            <a:pPr algn="ctr"/>
+            <a:endParaRPr lang="en-US"/>
+          </a:p>
+        </p:txBody>
+      </p:sp>
+      <p:sp>
+        <p:nvSpPr>
+          <p:cNvPr id="87" name="Cube 86"/>
+          <p:cNvSpPr/>
+          <p:nvPr/>
+        </p:nvSpPr>
+        <p:spPr>
+          <a:xfrm>
+            <a:off x="4677603" y="1861719"/>
+            <a:ext cx="373151" cy="238397"/>
+          </a:xfrm>
+          <a:prstGeom prst="cube">
+            <a:avLst/>
+          </a:prstGeom>
+        </p:spPr>
+        <p:style>
+          <a:lnRef idx="2">
+            <a:schemeClr val="accent5">
+              <a:shade val="50000"/>
+            </a:schemeClr>
+          </a:lnRef>
+          <a:fillRef idx="1">
+            <a:schemeClr val="accent5"/>
+          </a:fillRef>
+          <a:effectRef idx="0">
+            <a:schemeClr val="accent5"/>
+          </a:effectRef>
+          <a:fontRef idx="minor">
+            <a:schemeClr val="lt1"/>
+          </a:fontRef>
+        </p:style>
+        <p:txBody>
+          <a:bodyPr rtlCol="0" anchor="ctr"/>
+          <a:lstStyle/>
+          <a:p>
+            <a:pPr algn="ctr"/>
+            <a:endParaRPr lang="en-US"/>
+          </a:p>
+        </p:txBody>
+      </p:sp>
+      <p:sp>
+        <p:nvSpPr>
+          <p:cNvPr id="88" name="Cube 87"/>
+          <p:cNvSpPr/>
+          <p:nvPr/>
+        </p:nvSpPr>
+        <p:spPr>
+          <a:xfrm>
+            <a:off x="6329507" y="1533328"/>
+            <a:ext cx="373151" cy="238397"/>
+          </a:xfrm>
+          <a:prstGeom prst="cube">
+            <a:avLst/>
+          </a:prstGeom>
+        </p:spPr>
+        <p:style>
+          <a:lnRef idx="2">
+            <a:schemeClr val="accent5">
+              <a:shade val="50000"/>
+            </a:schemeClr>
+          </a:lnRef>
+          <a:fillRef idx="1">
+            <a:schemeClr val="accent5"/>
+          </a:fillRef>
+          <a:effectRef idx="0">
+            <a:schemeClr val="accent5"/>
+          </a:effectRef>
+          <a:fontRef idx="minor">
+            <a:schemeClr val="lt1"/>
+          </a:fontRef>
+        </p:style>
+        <p:txBody>
+          <a:bodyPr rtlCol="0" anchor="ctr"/>
+          <a:lstStyle/>
+          <a:p>
+            <a:pPr algn="ctr"/>
+            <a:endParaRPr lang="en-US"/>
+          </a:p>
+        </p:txBody>
+      </p:sp>
+      <p:sp>
+        <p:nvSpPr>
+          <p:cNvPr id="89" name="Cube 88"/>
+          <p:cNvSpPr/>
+          <p:nvPr/>
+        </p:nvSpPr>
+        <p:spPr>
+          <a:xfrm>
+            <a:off x="5216945" y="4693350"/>
+            <a:ext cx="373151" cy="238397"/>
+          </a:xfrm>
+          <a:prstGeom prst="cube">
+            <a:avLst/>
+          </a:prstGeom>
+        </p:spPr>
+        <p:style>
+          <a:lnRef idx="2">
+            <a:schemeClr val="accent4">
+              <a:shade val="50000"/>
+            </a:schemeClr>
+          </a:lnRef>
+          <a:fillRef idx="1">
+            <a:schemeClr val="accent4"/>
+          </a:fillRef>
+          <a:effectRef idx="0">
+            <a:schemeClr val="accent4"/>
+          </a:effectRef>
+          <a:fontRef idx="minor">
+            <a:schemeClr val="lt1"/>
+          </a:fontRef>
+        </p:style>
+        <p:txBody>
+          <a:bodyPr rtlCol="0" anchor="ctr"/>
+          <a:lstStyle/>
+          <a:p>
+            <a:pPr algn="ctr"/>
+            <a:endParaRPr lang="en-US"/>
+          </a:p>
+        </p:txBody>
+      </p:sp>
+      <p:sp>
+        <p:nvSpPr>
+          <p:cNvPr id="90" name="Rectangle 89"/>
+          <p:cNvSpPr/>
+          <p:nvPr/>
+        </p:nvSpPr>
+        <p:spPr>
+          <a:xfrm rot="19988843">
+            <a:off x="5507207" y="4650636"/>
+            <a:ext cx="386064" cy="94537"/>
+          </a:xfrm>
+          <a:prstGeom prst="rect">
+            <a:avLst/>
+          </a:prstGeom>
+        </p:spPr>
+        <p:style>
+          <a:lnRef idx="2">
+            <a:schemeClr val="accent4">
+              <a:shade val="50000"/>
+            </a:schemeClr>
+          </a:lnRef>
+          <a:fillRef idx="1">
+            <a:schemeClr val="accent4"/>
+          </a:fillRef>
+          <a:effectRef idx="0">
+            <a:schemeClr val="accent4"/>
+          </a:effectRef>
+          <a:fontRef idx="minor">
+            <a:schemeClr val="lt1"/>
+          </a:fontRef>
+        </p:style>
+        <p:txBody>
+          <a:bodyPr rtlCol="0" anchor="ctr"/>
+          <a:lstStyle/>
+          <a:p>
+            <a:pPr algn="ctr"/>
+            <a:endParaRPr lang="en-US"/>
+          </a:p>
+        </p:txBody>
+      </p:sp>
+      <p:sp>
+        <p:nvSpPr>
+          <p:cNvPr id="91" name="Rectangle 90"/>
+          <p:cNvSpPr/>
+          <p:nvPr/>
+        </p:nvSpPr>
+        <p:spPr>
+          <a:xfrm rot="19988843">
+            <a:off x="6542978" y="4704136"/>
+            <a:ext cx="386064" cy="94537"/>
+          </a:xfrm>
+          <a:prstGeom prst="rect">
+            <a:avLst/>
+          </a:prstGeom>
+        </p:spPr>
+        <p:style>
+          <a:lnRef idx="2">
+            <a:schemeClr val="accent6">
+              <a:shade val="50000"/>
+            </a:schemeClr>
+          </a:lnRef>
+          <a:fillRef idx="1">
+            <a:schemeClr val="accent6"/>
+          </a:fillRef>
+          <a:effectRef idx="0">
+            <a:schemeClr val="accent6"/>
+          </a:effectRef>
+          <a:fontRef idx="minor">
+            <a:schemeClr val="lt1"/>
+          </a:fontRef>
+        </p:style>
+        <p:txBody>
+          <a:bodyPr rtlCol="0" anchor="ctr"/>
+          <a:lstStyle/>
+          <a:p>
+            <a:pPr algn="ctr"/>
+            <a:endParaRPr lang="en-US"/>
+          </a:p>
+        </p:txBody>
+      </p:sp>
+      <p:sp>
+        <p:nvSpPr>
+          <p:cNvPr id="92" name="Rectangle 91"/>
+          <p:cNvSpPr/>
+          <p:nvPr/>
+        </p:nvSpPr>
+        <p:spPr>
+          <a:xfrm rot="19988843">
+            <a:off x="5982970" y="3718620"/>
+            <a:ext cx="386064" cy="94537"/>
+          </a:xfrm>
+          <a:prstGeom prst="rect">
+            <a:avLst/>
+          </a:prstGeom>
+        </p:spPr>
+        <p:style>
+          <a:lnRef idx="2">
+            <a:schemeClr val="accent6">
+              <a:shade val="50000"/>
+            </a:schemeClr>
+          </a:lnRef>
+          <a:fillRef idx="1">
+            <a:schemeClr val="accent6"/>
+          </a:fillRef>
+          <a:effectRef idx="0">
+            <a:schemeClr val="accent6"/>
+          </a:effectRef>
+          <a:fontRef idx="minor">
+            <a:schemeClr val="lt1"/>
+          </a:fontRef>
+        </p:style>
+        <p:txBody>
+          <a:bodyPr rtlCol="0" anchor="ctr"/>
+          <a:lstStyle/>
+          <a:p>
+            <a:pPr algn="ctr"/>
+            <a:endParaRPr lang="en-US"/>
+          </a:p>
+        </p:txBody>
+      </p:sp>
+      <p:sp>
+        <p:nvSpPr>
+          <p:cNvPr id="93" name="Rectangle 92"/>
+          <p:cNvSpPr/>
+          <p:nvPr/>
+        </p:nvSpPr>
+        <p:spPr>
+          <a:xfrm rot="19988843">
+            <a:off x="4989842" y="1761194"/>
+            <a:ext cx="386064" cy="94537"/>
+          </a:xfrm>
+          <a:prstGeom prst="rect">
+            <a:avLst/>
+          </a:prstGeom>
+        </p:spPr>
+        <p:style>
+          <a:lnRef idx="2">
+            <a:schemeClr val="accent5">
+              <a:shade val="50000"/>
+            </a:schemeClr>
+          </a:lnRef>
+          <a:fillRef idx="1">
+            <a:schemeClr val="accent5"/>
+          </a:fillRef>
+          <a:effectRef idx="0">
+            <a:schemeClr val="accent5"/>
+          </a:effectRef>
+          <a:fontRef idx="minor">
+            <a:schemeClr val="lt1"/>
+          </a:fontRef>
+        </p:style>
+        <p:txBody>
+          <a:bodyPr rtlCol="0" anchor="ctr"/>
+          <a:lstStyle/>
+          <a:p>
+            <a:pPr algn="ctr"/>
+            <a:endParaRPr lang="en-US"/>
+          </a:p>
+        </p:txBody>
+      </p:sp>
+      <p:sp>
+        <p:nvSpPr>
+          <p:cNvPr id="94" name="Rectangle 93"/>
+          <p:cNvSpPr/>
+          <p:nvPr/>
+        </p:nvSpPr>
+        <p:spPr>
+          <a:xfrm rot="19988843">
+            <a:off x="6025257" y="1786745"/>
+            <a:ext cx="386064" cy="94537"/>
+          </a:xfrm>
+          <a:prstGeom prst="rect">
+            <a:avLst/>
+          </a:prstGeom>
+        </p:spPr>
+        <p:style>
+          <a:lnRef idx="2">
+            <a:schemeClr val="accent5">
+              <a:shade val="50000"/>
+            </a:schemeClr>
+          </a:lnRef>
+          <a:fillRef idx="1">
+            <a:schemeClr val="accent5"/>
+          </a:fillRef>
+          <a:effectRef idx="0">
+            <a:schemeClr val="accent5"/>
+          </a:effectRef>
+          <a:fontRef idx="minor">
+            <a:schemeClr val="lt1"/>
+          </a:fontRef>
+        </p:style>
+        <p:txBody>
+          <a:bodyPr rtlCol="0" anchor="ctr"/>
+          <a:lstStyle/>
+          <a:p>
+            <a:pPr algn="ctr"/>
+            <a:endParaRPr lang="en-US"/>
+          </a:p>
+        </p:txBody>
+      </p:sp>
+      <p:pic>
+        <p:nvPicPr>
+          <p:cNvPr id="1032" name="Picture 8" descr="http://www.geekalerts.com/u/catan7.jpg"/>
+          <p:cNvPicPr>
+            <a:picLocks noChangeAspect="1" noChangeArrowheads="1"/>
+          </p:cNvPicPr>
+          <p:nvPr/>
+        </p:nvPicPr>
+        <p:blipFill rotWithShape="1">
+          <a:blip r:embed="rId16">
+            <a:extLst>
+              <a:ext uri="{28A0092B-C50C-407E-A947-70E740481C1C}">
+                <a14:useLocalDpi xmlns:a14="http://schemas.microsoft.com/office/drawing/2010/main" val="0"/>
+              </a:ext>
+            </a:extLst>
+          </a:blip>
+          <a:srcRect r="68688" b="57657"/>
+          <a:stretch/>
+        </p:blipFill>
+        <p:spPr bwMode="auto">
+          <a:xfrm>
+            <a:off x="6887808" y="5917082"/>
+            <a:ext cx="829014" cy="923015"/>
+          </a:xfrm>
+          <a:prstGeom prst="rect">
+            <a:avLst/>
+          </a:prstGeom>
+          <a:noFill/>
+          <a:extLst>
+            <a:ext uri="{909E8E84-426E-40DD-AFC4-6F175D3DCCD1}">
+              <a14:hiddenFill xmlns:a14="http://schemas.microsoft.com/office/drawing/2010/main">
+                <a:solidFill>
+                  <a:srgbClr val="FFFFFF"/>
+                </a:solidFill>
+              </a14:hiddenFill>
+            </a:ext>
+          </a:extLst>
+        </p:spPr>
+      </p:pic>
+      <p:pic>
+        <p:nvPicPr>
+          <p:cNvPr id="97" name="Picture 10" descr="http://www.geekalerts.com/u/catan7.jpg"/>
+          <p:cNvPicPr>
+            <a:picLocks noChangeAspect="1" noChangeArrowheads="1"/>
+          </p:cNvPicPr>
+          <p:nvPr/>
+        </p:nvPicPr>
+        <p:blipFill rotWithShape="1">
+          <a:blip r:embed="rId17">
+            <a:extLst>
+              <a:ext uri="{28A0092B-C50C-407E-A947-70E740481C1C}">
+                <a14:useLocalDpi xmlns:a14="http://schemas.microsoft.com/office/drawing/2010/main" val="0"/>
+              </a:ext>
+            </a:extLst>
+          </a:blip>
+          <a:srcRect l="34159" r="37366" b="57657"/>
+          <a:stretch/>
+        </p:blipFill>
+        <p:spPr bwMode="auto">
+          <a:xfrm>
+            <a:off x="6030079" y="5820325"/>
+            <a:ext cx="808802" cy="990234"/>
+          </a:xfrm>
+          <a:prstGeom prst="rect">
+            <a:avLst/>
+          </a:prstGeom>
+          <a:noFill/>
+          <a:extLst>
+            <a:ext uri="{909E8E84-426E-40DD-AFC4-6F175D3DCCD1}">
+              <a14:hiddenFill xmlns:a14="http://schemas.microsoft.com/office/drawing/2010/main">
+                <a:solidFill>
+                  <a:srgbClr val="FFFFFF"/>
+                </a:solidFill>
+              </a14:hiddenFill>
+            </a:ext>
+          </a:extLst>
+        </p:spPr>
+      </p:pic>
+      <p:pic>
+        <p:nvPicPr>
+          <p:cNvPr id="99" name="Picture 14" descr="http://www.geekalerts.com/u/catan7.jpg"/>
+          <p:cNvPicPr>
+            <a:picLocks noChangeAspect="1" noChangeArrowheads="1"/>
+          </p:cNvPicPr>
+          <p:nvPr/>
+        </p:nvPicPr>
+        <p:blipFill rotWithShape="1">
+          <a:blip r:embed="rId18">
+            <a:extLst>
+              <a:ext uri="{28A0092B-C50C-407E-A947-70E740481C1C}">
+                <a14:useLocalDpi xmlns:a14="http://schemas.microsoft.com/office/drawing/2010/main" val="0"/>
+              </a:ext>
+            </a:extLst>
+          </a:blip>
+          <a:srcRect l="53279" t="45636" r="13501" b="4793"/>
+          <a:stretch/>
+        </p:blipFill>
+        <p:spPr bwMode="auto">
+          <a:xfrm>
+            <a:off x="4242120" y="5742871"/>
+            <a:ext cx="870965" cy="1070043"/>
+          </a:xfrm>
+          <a:prstGeom prst="rect">
+            <a:avLst/>
+          </a:prstGeom>
+          <a:noFill/>
+          <a:extLst>
+            <a:ext uri="{909E8E84-426E-40DD-AFC4-6F175D3DCCD1}">
+              <a14:hiddenFill xmlns:a14="http://schemas.microsoft.com/office/drawing/2010/main">
+                <a:solidFill>
+                  <a:srgbClr val="FFFFFF"/>
+                </a:solidFill>
+              </a14:hiddenFill>
+            </a:ext>
+          </a:extLst>
+        </p:spPr>
+      </p:pic>
+      <p:pic>
+        <p:nvPicPr>
+          <p:cNvPr id="100" name="Picture 6" descr="http://www.geekalerts.com/u/catan7.jpg"/>
+          <p:cNvPicPr>
+            <a:picLocks noChangeAspect="1" noChangeArrowheads="1"/>
+          </p:cNvPicPr>
+          <p:nvPr/>
+        </p:nvPicPr>
+        <p:blipFill rotWithShape="1">
+          <a:blip r:embed="rId19" cstate="print">
+            <a:extLst>
+              <a:ext uri="{28A0092B-C50C-407E-A947-70E740481C1C}">
+                <a14:useLocalDpi xmlns:a14="http://schemas.microsoft.com/office/drawing/2010/main" val="0"/>
+              </a:ext>
+            </a:extLst>
+          </a:blip>
+          <a:srcRect l="11922" t="46296" r="53231" b="5451"/>
+          <a:stretch/>
+        </p:blipFill>
+        <p:spPr bwMode="auto">
+          <a:xfrm>
+            <a:off x="5069276" y="5880609"/>
+            <a:ext cx="839099" cy="956638"/>
+          </a:xfrm>
+          <a:prstGeom prst="rect">
+            <a:avLst/>
+          </a:prstGeom>
+          <a:noFill/>
+          <a:extLst>
+            <a:ext uri="{909E8E84-426E-40DD-AFC4-6F175D3DCCD1}">
+              <a14:hiddenFill xmlns:a14="http://schemas.microsoft.com/office/drawing/2010/main">
+                <a:solidFill>
+                  <a:srgbClr val="FFFFFF"/>
+                </a:solidFill>
+              </a14:hiddenFill>
+            </a:ext>
+          </a:extLst>
+        </p:spPr>
+      </p:pic>
+      <p:pic>
+        <p:nvPicPr>
+          <p:cNvPr id="24" name="Picture 2" descr="https://lh4.googleusercontent.com/W2whVK6ToWyaeRQHzcyZSPJKJ89LujTkf1gSQXYoWlHKnIOX-kfElem_x471hmZZ5SuSzY3lgqMTx5PtwP2lWEieTxPq_aVr8dan1XWw0d8VXEkyyew"/>
+          <p:cNvPicPr>
+            <a:picLocks noChangeAspect="1" noChangeArrowheads="1"/>
+          </p:cNvPicPr>
+          <p:nvPr/>
+        </p:nvPicPr>
+        <p:blipFill>
+          <a:blip r:embed="rId20">
+            <a:extLst>
+              <a:ext uri="{28A0092B-C50C-407E-A947-70E740481C1C}">
+                <a14:useLocalDpi xmlns:a14="http://schemas.microsoft.com/office/drawing/2010/main" val="0"/>
+              </a:ext>
+            </a:extLst>
+          </a:blip>
+          <a:srcRect/>
+          <a:stretch>
+            <a:fillRect/>
+          </a:stretch>
+        </p:blipFill>
+        <p:spPr bwMode="auto">
+          <a:xfrm>
+            <a:off x="9581568" y="4241136"/>
+            <a:ext cx="2575642" cy="2611729"/>
+          </a:xfrm>
+          <a:prstGeom prst="rect">
+            <a:avLst/>
+          </a:prstGeom>
+          <a:noFill/>
+          <a:extLst>
+            <a:ext uri="{909E8E84-426E-40DD-AFC4-6F175D3DCCD1}">
+              <a14:hiddenFill xmlns:a14="http://schemas.microsoft.com/office/drawing/2010/main">
+                <a:solidFill>
+                  <a:srgbClr val="FFFFFF"/>
+                </a:solidFill>
+              </a14:hiddenFill>
+            </a:ext>
+          </a:extLst>
+        </p:spPr>
+      </p:pic>
+      <p:sp>
+        <p:nvSpPr>
+          <p:cNvPr id="102" name="Rectangle 101"/>
+          <p:cNvSpPr/>
+          <p:nvPr/>
+        </p:nvSpPr>
+        <p:spPr>
+          <a:xfrm>
+            <a:off x="30049" y="4571999"/>
+            <a:ext cx="1983783" cy="2261012"/>
+          </a:xfrm>
+          <a:prstGeom prst="rect">
+            <a:avLst/>
+          </a:prstGeom>
+        </p:spPr>
+        <p:style>
+          <a:lnRef idx="2">
+            <a:schemeClr val="dk1"/>
+          </a:lnRef>
+          <a:fillRef idx="1">
+            <a:schemeClr val="lt1"/>
+          </a:fillRef>
+          <a:effectRef idx="0">
+            <a:schemeClr val="dk1"/>
+          </a:effectRef>
+          <a:fontRef idx="minor">
+            <a:schemeClr val="dk1"/>
+          </a:fontRef>
+        </p:style>
+        <p:txBody>
+          <a:bodyPr rtlCol="0" anchor="t"/>
+          <a:lstStyle/>
+          <a:p>
+            <a:pPr algn="ctr"/>
+            <a:r>
+              <a:rPr lang="en-US" u="sng" dirty="0" smtClean="0"/>
+              <a:t>Chat</a:t>
+            </a:r>
+            <a:endParaRPr lang="en-US" u="sng" dirty="0"/>
+          </a:p>
+        </p:txBody>
+      </p:sp>
+      <p:sp>
+        <p:nvSpPr>
+          <p:cNvPr id="103" name="Rectangle 102"/>
+          <p:cNvSpPr/>
+          <p:nvPr/>
+        </p:nvSpPr>
+        <p:spPr>
+          <a:xfrm>
+            <a:off x="148701" y="1479527"/>
+            <a:ext cx="1163963" cy="399142"/>
+          </a:xfrm>
+          <a:prstGeom prst="rect">
+            <a:avLst/>
+          </a:prstGeom>
+        </p:spPr>
+        <p:style>
+          <a:lnRef idx="2">
+            <a:schemeClr val="dk1"/>
+          </a:lnRef>
+          <a:fillRef idx="1">
+            <a:schemeClr val="lt1"/>
+          </a:fillRef>
+          <a:effectRef idx="0">
+            <a:schemeClr val="dk1"/>
+          </a:effectRef>
+          <a:fontRef idx="minor">
+            <a:schemeClr val="dk1"/>
+          </a:fontRef>
+        </p:style>
+        <p:txBody>
+          <a:bodyPr rtlCol="0" anchor="ctr"/>
+          <a:lstStyle/>
+          <a:p>
+            <a:pPr algn="ctr"/>
+            <a:r>
+              <a:rPr lang="en-US" dirty="0" smtClean="0"/>
+              <a:t>Player 2</a:t>
+            </a:r>
+            <a:endParaRPr lang="en-US" dirty="0"/>
+          </a:p>
+        </p:txBody>
+      </p:sp>
+      <p:sp>
+        <p:nvSpPr>
+          <p:cNvPr id="105" name="Rectangle 104"/>
+          <p:cNvSpPr/>
+          <p:nvPr/>
+        </p:nvSpPr>
+        <p:spPr>
+          <a:xfrm>
+            <a:off x="4837548" y="82878"/>
+            <a:ext cx="1163963" cy="399142"/>
+          </a:xfrm>
+          <a:prstGeom prst="rect">
+            <a:avLst/>
+          </a:prstGeom>
+        </p:spPr>
+        <p:style>
+          <a:lnRef idx="2">
+            <a:schemeClr val="dk1"/>
+          </a:lnRef>
+          <a:fillRef idx="1">
+            <a:schemeClr val="lt1"/>
+          </a:fillRef>
+          <a:effectRef idx="0">
+            <a:schemeClr val="dk1"/>
+          </a:effectRef>
+          <a:fontRef idx="minor">
+            <a:schemeClr val="dk1"/>
+          </a:fontRef>
+        </p:style>
+        <p:txBody>
+          <a:bodyPr rtlCol="0" anchor="ctr"/>
+          <a:lstStyle/>
+          <a:p>
+            <a:pPr algn="ctr"/>
+            <a:r>
+              <a:rPr lang="en-US" dirty="0" smtClean="0"/>
+              <a:t>Player 3</a:t>
+            </a:r>
+            <a:endParaRPr lang="en-US" dirty="0"/>
+          </a:p>
+        </p:txBody>
+      </p:sp>
+      <p:sp>
+        <p:nvSpPr>
+          <p:cNvPr id="107" name="Rectangle 106"/>
+          <p:cNvSpPr/>
+          <p:nvPr/>
+        </p:nvSpPr>
+        <p:spPr>
+          <a:xfrm>
+            <a:off x="10440900" y="1479527"/>
+            <a:ext cx="1163963" cy="399142"/>
+          </a:xfrm>
+          <a:prstGeom prst="rect">
+            <a:avLst/>
+          </a:prstGeom>
+        </p:spPr>
+        <p:style>
+          <a:lnRef idx="2">
+            <a:schemeClr val="dk1"/>
+          </a:lnRef>
+          <a:fillRef idx="1">
+            <a:schemeClr val="lt1"/>
+          </a:fillRef>
+          <a:effectRef idx="0">
+            <a:schemeClr val="dk1"/>
+          </a:effectRef>
+          <a:fontRef idx="minor">
+            <a:schemeClr val="dk1"/>
+          </a:fontRef>
+        </p:style>
+        <p:txBody>
+          <a:bodyPr rtlCol="0" anchor="ctr"/>
+          <a:lstStyle/>
+          <a:p>
+            <a:pPr algn="ctr"/>
+            <a:r>
+              <a:rPr lang="en-US" dirty="0" smtClean="0"/>
+              <a:t>Player 4</a:t>
+            </a:r>
+            <a:endParaRPr lang="en-US" dirty="0"/>
+          </a:p>
+        </p:txBody>
+      </p:sp>
+      <p:sp>
+        <p:nvSpPr>
+          <p:cNvPr id="104" name="Rectangle 103"/>
+          <p:cNvSpPr/>
+          <p:nvPr/>
+        </p:nvSpPr>
+        <p:spPr>
+          <a:xfrm rot="1896610">
+            <a:off x="7724805" y="3733892"/>
+            <a:ext cx="386064" cy="94537"/>
+          </a:xfrm>
+          <a:prstGeom prst="rect">
+            <a:avLst/>
+          </a:prstGeom>
+        </p:spPr>
+        <p:style>
+          <a:lnRef idx="2">
+            <a:schemeClr val="accent2">
+              <a:shade val="50000"/>
+            </a:schemeClr>
+          </a:lnRef>
+          <a:fillRef idx="1">
+            <a:schemeClr val="accent2"/>
+          </a:fillRef>
+          <a:effectRef idx="0">
+            <a:schemeClr val="accent2"/>
+          </a:effectRef>
+          <a:fontRef idx="minor">
+            <a:schemeClr val="lt1"/>
+          </a:fontRef>
+        </p:style>
+        <p:txBody>
+          <a:bodyPr rtlCol="0" anchor="ctr"/>
+          <a:lstStyle/>
+          <a:p>
+            <a:pPr algn="ctr"/>
+            <a:endParaRPr lang="en-US"/>
+          </a:p>
+        </p:txBody>
+      </p:sp>
+      <p:sp>
+        <p:nvSpPr>
+          <p:cNvPr id="25" name="Rectangle 24"/>
+          <p:cNvSpPr/>
+          <p:nvPr/>
+        </p:nvSpPr>
+        <p:spPr>
+          <a:xfrm>
+            <a:off x="1725283" y="383207"/>
+            <a:ext cx="7750848" cy="5767103"/>
+          </a:xfrm>
+          <a:prstGeom prst="rect">
+            <a:avLst/>
+          </a:prstGeom>
+        </p:spPr>
+        <p:style>
+          <a:lnRef idx="3">
+            <a:schemeClr val="lt1"/>
+          </a:lnRef>
+          <a:fillRef idx="1">
+            <a:schemeClr val="accent2"/>
+          </a:fillRef>
+          <a:effectRef idx="1">
+            <a:schemeClr val="accent2"/>
+          </a:effectRef>
+          <a:fontRef idx="minor">
+            <a:schemeClr val="lt1"/>
+          </a:fontRef>
+        </p:style>
+        <p:txBody>
+          <a:bodyPr rtlCol="0" anchor="t"/>
+          <a:lstStyle/>
+          <a:p>
+            <a:pPr algn="ctr"/>
+            <a:endParaRPr lang="en-US" dirty="0" smtClean="0"/>
+          </a:p>
+          <a:p>
+            <a:pPr algn="ctr"/>
+            <a:r>
+              <a:rPr lang="en-US" dirty="0" smtClean="0"/>
+              <a:t>Game Over! Player 1 Wins!</a:t>
+            </a:r>
+          </a:p>
+          <a:p>
+            <a:pPr algn="ctr"/>
+            <a:endParaRPr lang="en-US" dirty="0" smtClean="0"/>
+          </a:p>
+          <a:p>
+            <a:pPr algn="ctr"/>
+            <a:endParaRPr lang="en-US" dirty="0" smtClean="0"/>
+          </a:p>
+          <a:p>
+            <a:pPr algn="ctr"/>
+            <a:r>
+              <a:rPr lang="en-US" dirty="0" smtClean="0"/>
+              <a:t>Statistics</a:t>
+            </a:r>
+          </a:p>
+          <a:p>
+            <a:r>
+              <a:rPr lang="en-US" u="sng" dirty="0" smtClean="0"/>
+              <a:t>Player</a:t>
+            </a:r>
+            <a:r>
+              <a:rPr lang="en-US" dirty="0" smtClean="0"/>
+              <a:t>	</a:t>
+            </a:r>
+            <a:r>
+              <a:rPr lang="en-US" u="sng" dirty="0" smtClean="0"/>
+              <a:t>Victory Points</a:t>
+            </a:r>
+            <a:r>
+              <a:rPr lang="en-US" dirty="0" smtClean="0"/>
+              <a:t>	</a:t>
+            </a:r>
+            <a:r>
+              <a:rPr lang="en-US" u="sng" dirty="0" smtClean="0"/>
+              <a:t>Number of Settlements</a:t>
+            </a:r>
+            <a:r>
+              <a:rPr lang="en-US" dirty="0"/>
+              <a:t>	</a:t>
+            </a:r>
+            <a:r>
+              <a:rPr lang="en-US" u="sng" dirty="0" smtClean="0"/>
+              <a:t>Number of Cities</a:t>
+            </a:r>
+            <a:endParaRPr lang="en-US" dirty="0" smtClean="0"/>
+          </a:p>
+          <a:p>
+            <a:r>
+              <a:rPr lang="en-US" dirty="0"/>
+              <a:t> </a:t>
+            </a:r>
+            <a:r>
+              <a:rPr lang="en-US" dirty="0" smtClean="0"/>
+              <a:t>   1	        10                                        4			3</a:t>
+            </a:r>
+          </a:p>
+          <a:p>
+            <a:r>
+              <a:rPr lang="en-US" dirty="0"/>
+              <a:t> </a:t>
+            </a:r>
+            <a:r>
+              <a:rPr lang="en-US" dirty="0" smtClean="0"/>
+              <a:t>   2	         8			2			2</a:t>
+            </a:r>
+          </a:p>
+          <a:p>
+            <a:r>
+              <a:rPr lang="en-US" dirty="0"/>
+              <a:t> </a:t>
+            </a:r>
+            <a:r>
+              <a:rPr lang="en-US" dirty="0" smtClean="0"/>
+              <a:t>   3	         7			2			2</a:t>
+            </a:r>
+          </a:p>
+          <a:p>
+            <a:r>
+              <a:rPr lang="en-US" dirty="0"/>
+              <a:t> </a:t>
+            </a:r>
+            <a:r>
+              <a:rPr lang="en-US" dirty="0" smtClean="0"/>
+              <a:t>   4	         6			1			2</a:t>
+            </a:r>
+            <a:endParaRPr lang="en-US" dirty="0"/>
+          </a:p>
+        </p:txBody>
+      </p:sp>
+      <p:sp>
+        <p:nvSpPr>
+          <p:cNvPr id="26" name="Rectangle 25"/>
+          <p:cNvSpPr/>
+          <p:nvPr/>
+        </p:nvSpPr>
+        <p:spPr>
+          <a:xfrm>
+            <a:off x="7773121" y="5325250"/>
+            <a:ext cx="1234714" cy="577755"/>
+          </a:xfrm>
+          <a:prstGeom prst="rect">
+            <a:avLst/>
+          </a:prstGeom>
+        </p:spPr>
+        <p:style>
+          <a:lnRef idx="2">
+            <a:schemeClr val="dk1"/>
+          </a:lnRef>
+          <a:fillRef idx="1">
+            <a:schemeClr val="lt1"/>
+          </a:fillRef>
+          <a:effectRef idx="0">
+            <a:schemeClr val="dk1"/>
+          </a:effectRef>
+          <a:fontRef idx="minor">
+            <a:schemeClr val="dk1"/>
+          </a:fontRef>
+        </p:style>
+        <p:txBody>
+          <a:bodyPr rtlCol="0" anchor="ctr"/>
+          <a:lstStyle/>
+          <a:p>
+            <a:pPr algn="ctr"/>
+            <a:r>
+              <a:rPr lang="en-US" dirty="0" smtClean="0"/>
+              <a:t>Quit</a:t>
+            </a:r>
+            <a:endParaRPr lang="en-US" dirty="0"/>
+          </a:p>
+        </p:txBody>
+      </p:sp>
+    </p:spTree>
+    <p:extLst>
+      <p:ext uri="{BB962C8B-B14F-4D97-AF65-F5344CB8AC3E}">
+        <p14:creationId xmlns:p14="http://schemas.microsoft.com/office/powerpoint/2010/main" val="1298404810"/>
+      </p:ext>
+    </p:extLst>
+  </p:cSld>
+  <p:clrMapOvr>
+    <a:masterClrMapping/>
+  </p:clrMapOvr>
+</p:sld>
+</file>
+
 <file path=ppt/slides/slide2.xml><?xml version="1.0" encoding="utf-8"?>
 <p:sld xmlns:a="http://schemas.openxmlformats.org/drawingml/2006/main" xmlns:r="http://schemas.openxmlformats.org/officeDocument/2006/relationships" xmlns:p="http://schemas.openxmlformats.org/presentationml/2006/main">
   <p:cSld>

</xml_diff>